<commit_message>
completed recording of part 1
</commit_message>
<xml_diff>
--- a/slides/powerpoint/01_basics.pptx
+++ b/slides/powerpoint/01_basics.pptx
@@ -6,10 +6,10 @@
     <p:sldMasterId id="2147483673" r:id="rId2"/>
   </p:sldMasterIdLst>
   <p:notesMasterIdLst>
-    <p:notesMasterId r:id="rId16"/>
+    <p:notesMasterId r:id="rId17"/>
   </p:notesMasterIdLst>
   <p:sldIdLst>
-    <p:sldId id="280" r:id="rId3"/>
+    <p:sldId id="291" r:id="rId3"/>
     <p:sldId id="893" r:id="rId4"/>
     <p:sldId id="835" r:id="rId5"/>
     <p:sldId id="847" r:id="rId6"/>
@@ -22,6 +22,7 @@
     <p:sldId id="898" r:id="rId13"/>
     <p:sldId id="899" r:id="rId14"/>
     <p:sldId id="900" r:id="rId15"/>
+    <p:sldId id="290" r:id="rId16"/>
   </p:sldIdLst>
   <p:sldSz cx="12192000" cy="6858000"/>
   <p:notesSz cx="6858000" cy="9144000"/>
@@ -221,7 +222,7 @@
           <a:p>
             <a:fld id="{D0FE861C-486B-4E18-A0E9-A790238A915C}" type="datetimeFigureOut">
               <a:rPr lang="en-US" smtClean="0"/>
-              <a:t>8/26/21</a:t>
+              <a:t>9/9/21</a:t>
             </a:fld>
             <a:endParaRPr lang="en-US"/>
           </a:p>
@@ -529,7 +530,10 @@
           <a:bodyPr/>
           <a:lstStyle/>
           <a:p>
-            <a:endParaRPr lang="en-US" dirty="0"/>
+            <a:r>
+              <a:rPr lang="en-US" dirty="0"/>
+              <a:t>Welcome to Finding Data Science Help Online. In this video, we will discuss Navigating Online Data Science Resources.</a:t>
+            </a:r>
           </a:p>
         </p:txBody>
       </p:sp>
@@ -540,7 +544,7 @@
             <a:spLocks noGrp="1"/>
           </p:cNvSpPr>
           <p:nvPr>
-            <p:ph type="sldNum" sz="quarter" idx="10"/>
+            <p:ph type="sldNum" sz="quarter" idx="5"/>
           </p:nvPr>
         </p:nvSpPr>
         <p:spPr/>
@@ -548,65 +552,453 @@
           <a:bodyPr/>
           <a:lstStyle/>
           <a:p>
-            <a:pPr algn="r"/>
-            <a:fld id="{111E5896-917A-4035-A860-408E1EC3CD51}" type="slidenum">
-              <a:rPr lang="en-US" smtClean="0">
-                <a:solidFill>
-                  <a:srgbClr val="052049"/>
-                </a:solidFill>
-                <a:latin typeface="Arial" pitchFamily="34" charset="0"/>
-                <a:cs typeface="Arial" pitchFamily="34" charset="0"/>
-              </a:rPr>
-              <a:pPr algn="r"/>
-              <a:t>2</a:t>
+            <a:fld id="{DF811066-0135-4CAA-8AD4-89A97190AC00}" type="slidenum">
+              <a:rPr lang="en-US" smtClean="0"/>
+              <a:t>1</a:t>
             </a:fld>
-            <a:endParaRPr lang="en-US" dirty="0">
-              <a:solidFill>
-                <a:srgbClr val="052049"/>
-              </a:solidFill>
-              <a:latin typeface="Arial" pitchFamily="34" charset="0"/>
-              <a:cs typeface="Arial" pitchFamily="34" charset="0"/>
-            </a:endParaRPr>
-          </a:p>
-        </p:txBody>
-      </p:sp>
-      <p:sp>
-        <p:nvSpPr>
-          <p:cNvPr id="5" name="Footer Placeholder 4"/>
-          <p:cNvSpPr>
-            <a:spLocks noGrp="1"/>
-          </p:cNvSpPr>
-          <p:nvPr>
-            <p:ph type="ftr" sz="quarter" idx="11"/>
-          </p:nvPr>
-        </p:nvSpPr>
-        <p:spPr/>
-        <p:txBody>
-          <a:bodyPr/>
-          <a:lstStyle/>
-          <a:p>
-            <a:r>
-              <a:rPr lang="en-US" sz="800">
-                <a:solidFill>
-                  <a:srgbClr val="052049"/>
-                </a:solidFill>
-                <a:latin typeface="+mj-lt"/>
-              </a:rPr>
-              <a:t>| [footer text here]</a:t>
-            </a:r>
-            <a:endParaRPr lang="en-US" sz="800" dirty="0">
-              <a:solidFill>
-                <a:srgbClr val="052049"/>
-              </a:solidFill>
-              <a:latin typeface="+mj-lt"/>
-            </a:endParaRPr>
+            <a:endParaRPr lang="en-US"/>
           </a:p>
         </p:txBody>
       </p:sp>
     </p:spTree>
     <p:extLst>
       <p:ext uri="{BB962C8B-B14F-4D97-AF65-F5344CB8AC3E}">
-        <p14:creationId xmlns:p14="http://schemas.microsoft.com/office/powerpoint/2010/main" val="3205321747"/>
+        <p14:creationId xmlns:p14="http://schemas.microsoft.com/office/powerpoint/2010/main" val="1725704751"/>
+      </p:ext>
+    </p:extLst>
+  </p:cSld>
+  <p:clrMapOvr>
+    <a:masterClrMapping/>
+  </p:clrMapOvr>
+</p:notes>
+</file>
+
+<file path=ppt/notesSlides/notesSlide10.xml><?xml version="1.0" encoding="utf-8"?>
+<p:notes xmlns:a="http://schemas.openxmlformats.org/drawingml/2006/main" xmlns:r="http://schemas.openxmlformats.org/officeDocument/2006/relationships" xmlns:p="http://schemas.openxmlformats.org/presentationml/2006/main">
+  <p:cSld>
+    <p:spTree>
+      <p:nvGrpSpPr>
+        <p:cNvPr id="1" name=""/>
+        <p:cNvGrpSpPr/>
+        <p:nvPr/>
+      </p:nvGrpSpPr>
+      <p:grpSpPr>
+        <a:xfrm>
+          <a:off x="0" y="0"/>
+          <a:ext cx="0" cy="0"/>
+          <a:chOff x="0" y="0"/>
+          <a:chExt cx="0" cy="0"/>
+        </a:xfrm>
+      </p:grpSpPr>
+      <p:sp>
+        <p:nvSpPr>
+          <p:cNvPr id="2" name="Slide Image Placeholder 1"/>
+          <p:cNvSpPr>
+            <a:spLocks noGrp="1" noRot="1" noChangeAspect="1"/>
+          </p:cNvSpPr>
+          <p:nvPr>
+            <p:ph type="sldImg"/>
+          </p:nvPr>
+        </p:nvSpPr>
+        <p:spPr/>
+      </p:sp>
+      <p:sp>
+        <p:nvSpPr>
+          <p:cNvPr id="3" name="Notes Placeholder 2"/>
+          <p:cNvSpPr>
+            <a:spLocks noGrp="1"/>
+          </p:cNvSpPr>
+          <p:nvPr>
+            <p:ph type="body" idx="1"/>
+          </p:nvPr>
+        </p:nvSpPr>
+        <p:spPr/>
+        <p:txBody>
+          <a:bodyPr/>
+          <a:lstStyle/>
+          <a:p>
+            <a:r>
+              <a:rPr lang="en-US" dirty="0"/>
+              <a:t>Let’s try another one … </a:t>
+            </a:r>
+          </a:p>
+        </p:txBody>
+      </p:sp>
+      <p:sp>
+        <p:nvSpPr>
+          <p:cNvPr id="4" name="Slide Number Placeholder 3"/>
+          <p:cNvSpPr>
+            <a:spLocks noGrp="1"/>
+          </p:cNvSpPr>
+          <p:nvPr>
+            <p:ph type="sldNum" sz="quarter" idx="5"/>
+          </p:nvPr>
+        </p:nvSpPr>
+        <p:spPr/>
+        <p:txBody>
+          <a:bodyPr/>
+          <a:lstStyle/>
+          <a:p>
+            <a:fld id="{DF811066-0135-4CAA-8AD4-89A97190AC00}" type="slidenum">
+              <a:rPr lang="en-US" smtClean="0"/>
+              <a:t>10</a:t>
+            </a:fld>
+            <a:endParaRPr lang="en-US"/>
+          </a:p>
+        </p:txBody>
+      </p:sp>
+    </p:spTree>
+    <p:extLst>
+      <p:ext uri="{BB962C8B-B14F-4D97-AF65-F5344CB8AC3E}">
+        <p14:creationId xmlns:p14="http://schemas.microsoft.com/office/powerpoint/2010/main" val="2860835470"/>
+      </p:ext>
+    </p:extLst>
+  </p:cSld>
+  <p:clrMapOvr>
+    <a:masterClrMapping/>
+  </p:clrMapOvr>
+</p:notes>
+</file>
+
+<file path=ppt/notesSlides/notesSlide11.xml><?xml version="1.0" encoding="utf-8"?>
+<p:notes xmlns:a="http://schemas.openxmlformats.org/drawingml/2006/main" xmlns:r="http://schemas.openxmlformats.org/officeDocument/2006/relationships" xmlns:p="http://schemas.openxmlformats.org/presentationml/2006/main">
+  <p:cSld>
+    <p:spTree>
+      <p:nvGrpSpPr>
+        <p:cNvPr id="1" name=""/>
+        <p:cNvGrpSpPr/>
+        <p:nvPr/>
+      </p:nvGrpSpPr>
+      <p:grpSpPr>
+        <a:xfrm>
+          <a:off x="0" y="0"/>
+          <a:ext cx="0" cy="0"/>
+          <a:chOff x="0" y="0"/>
+          <a:chExt cx="0" cy="0"/>
+        </a:xfrm>
+      </p:grpSpPr>
+      <p:sp>
+        <p:nvSpPr>
+          <p:cNvPr id="2" name="Slide Image Placeholder 1"/>
+          <p:cNvSpPr>
+            <a:spLocks noGrp="1" noRot="1" noChangeAspect="1"/>
+          </p:cNvSpPr>
+          <p:nvPr>
+            <p:ph type="sldImg"/>
+          </p:nvPr>
+        </p:nvSpPr>
+        <p:spPr/>
+      </p:sp>
+      <p:sp>
+        <p:nvSpPr>
+          <p:cNvPr id="3" name="Notes Placeholder 2"/>
+          <p:cNvSpPr>
+            <a:spLocks noGrp="1"/>
+          </p:cNvSpPr>
+          <p:nvPr>
+            <p:ph type="body" idx="1"/>
+          </p:nvPr>
+        </p:nvSpPr>
+        <p:spPr/>
+        <p:txBody>
+          <a:bodyPr/>
+          <a:lstStyle/>
+          <a:p>
+            <a:r>
+              <a:rPr lang="en-US" dirty="0"/>
+              <a:t>The answer here is Technical Documentation. Even for tools you use regularly, you will forget the specifics at times, and looking up technical documentation is a normal part of doing data science.</a:t>
+            </a:r>
+          </a:p>
+        </p:txBody>
+      </p:sp>
+      <p:sp>
+        <p:nvSpPr>
+          <p:cNvPr id="4" name="Slide Number Placeholder 3"/>
+          <p:cNvSpPr>
+            <a:spLocks noGrp="1"/>
+          </p:cNvSpPr>
+          <p:nvPr>
+            <p:ph type="sldNum" sz="quarter" idx="5"/>
+          </p:nvPr>
+        </p:nvSpPr>
+        <p:spPr/>
+        <p:txBody>
+          <a:bodyPr/>
+          <a:lstStyle/>
+          <a:p>
+            <a:fld id="{DF811066-0135-4CAA-8AD4-89A97190AC00}" type="slidenum">
+              <a:rPr lang="en-US" smtClean="0"/>
+              <a:t>11</a:t>
+            </a:fld>
+            <a:endParaRPr lang="en-US"/>
+          </a:p>
+        </p:txBody>
+      </p:sp>
+    </p:spTree>
+    <p:extLst>
+      <p:ext uri="{BB962C8B-B14F-4D97-AF65-F5344CB8AC3E}">
+        <p14:creationId xmlns:p14="http://schemas.microsoft.com/office/powerpoint/2010/main" val="1910778108"/>
+      </p:ext>
+    </p:extLst>
+  </p:cSld>
+  <p:clrMapOvr>
+    <a:masterClrMapping/>
+  </p:clrMapOvr>
+</p:notes>
+</file>
+
+<file path=ppt/notesSlides/notesSlide12.xml><?xml version="1.0" encoding="utf-8"?>
+<p:notes xmlns:a="http://schemas.openxmlformats.org/drawingml/2006/main" xmlns:r="http://schemas.openxmlformats.org/officeDocument/2006/relationships" xmlns:p="http://schemas.openxmlformats.org/presentationml/2006/main">
+  <p:cSld>
+    <p:spTree>
+      <p:nvGrpSpPr>
+        <p:cNvPr id="1" name=""/>
+        <p:cNvGrpSpPr/>
+        <p:nvPr/>
+      </p:nvGrpSpPr>
+      <p:grpSpPr>
+        <a:xfrm>
+          <a:off x="0" y="0"/>
+          <a:ext cx="0" cy="0"/>
+          <a:chOff x="0" y="0"/>
+          <a:chExt cx="0" cy="0"/>
+        </a:xfrm>
+      </p:grpSpPr>
+      <p:sp>
+        <p:nvSpPr>
+          <p:cNvPr id="2" name="Slide Image Placeholder 1"/>
+          <p:cNvSpPr>
+            <a:spLocks noGrp="1" noRot="1" noChangeAspect="1"/>
+          </p:cNvSpPr>
+          <p:nvPr>
+            <p:ph type="sldImg"/>
+          </p:nvPr>
+        </p:nvSpPr>
+        <p:spPr/>
+      </p:sp>
+      <p:sp>
+        <p:nvSpPr>
+          <p:cNvPr id="3" name="Notes Placeholder 2"/>
+          <p:cNvSpPr>
+            <a:spLocks noGrp="1"/>
+          </p:cNvSpPr>
+          <p:nvPr>
+            <p:ph type="body" idx="1"/>
+          </p:nvPr>
+        </p:nvSpPr>
+        <p:spPr/>
+        <p:txBody>
+          <a:bodyPr/>
+          <a:lstStyle/>
+          <a:p>
+            <a:r>
+              <a:rPr lang="en-US" dirty="0"/>
+              <a:t>Last question… </a:t>
+            </a:r>
+          </a:p>
+        </p:txBody>
+      </p:sp>
+      <p:sp>
+        <p:nvSpPr>
+          <p:cNvPr id="4" name="Slide Number Placeholder 3"/>
+          <p:cNvSpPr>
+            <a:spLocks noGrp="1"/>
+          </p:cNvSpPr>
+          <p:nvPr>
+            <p:ph type="sldNum" sz="quarter" idx="5"/>
+          </p:nvPr>
+        </p:nvSpPr>
+        <p:spPr/>
+        <p:txBody>
+          <a:bodyPr/>
+          <a:lstStyle/>
+          <a:p>
+            <a:fld id="{DF811066-0135-4CAA-8AD4-89A97190AC00}" type="slidenum">
+              <a:rPr lang="en-US" smtClean="0"/>
+              <a:t>12</a:t>
+            </a:fld>
+            <a:endParaRPr lang="en-US"/>
+          </a:p>
+        </p:txBody>
+      </p:sp>
+    </p:spTree>
+    <p:extLst>
+      <p:ext uri="{BB962C8B-B14F-4D97-AF65-F5344CB8AC3E}">
+        <p14:creationId xmlns:p14="http://schemas.microsoft.com/office/powerpoint/2010/main" val="952737182"/>
+      </p:ext>
+    </p:extLst>
+  </p:cSld>
+  <p:clrMapOvr>
+    <a:masterClrMapping/>
+  </p:clrMapOvr>
+</p:notes>
+</file>
+
+<file path=ppt/notesSlides/notesSlide13.xml><?xml version="1.0" encoding="utf-8"?>
+<p:notes xmlns:a="http://schemas.openxmlformats.org/drawingml/2006/main" xmlns:r="http://schemas.openxmlformats.org/officeDocument/2006/relationships" xmlns:p="http://schemas.openxmlformats.org/presentationml/2006/main">
+  <p:cSld>
+    <p:spTree>
+      <p:nvGrpSpPr>
+        <p:cNvPr id="1" name=""/>
+        <p:cNvGrpSpPr/>
+        <p:nvPr/>
+      </p:nvGrpSpPr>
+      <p:grpSpPr>
+        <a:xfrm>
+          <a:off x="0" y="0"/>
+          <a:ext cx="0" cy="0"/>
+          <a:chOff x="0" y="0"/>
+          <a:chExt cx="0" cy="0"/>
+        </a:xfrm>
+      </p:grpSpPr>
+      <p:sp>
+        <p:nvSpPr>
+          <p:cNvPr id="2" name="Slide Image Placeholder 1"/>
+          <p:cNvSpPr>
+            <a:spLocks noGrp="1" noRot="1" noChangeAspect="1"/>
+          </p:cNvSpPr>
+          <p:nvPr>
+            <p:ph type="sldImg"/>
+          </p:nvPr>
+        </p:nvSpPr>
+        <p:spPr/>
+      </p:sp>
+      <p:sp>
+        <p:nvSpPr>
+          <p:cNvPr id="3" name="Notes Placeholder 2"/>
+          <p:cNvSpPr>
+            <a:spLocks noGrp="1"/>
+          </p:cNvSpPr>
+          <p:nvPr>
+            <p:ph type="body" idx="1"/>
+          </p:nvPr>
+        </p:nvSpPr>
+        <p:spPr/>
+        <p:txBody>
+          <a:bodyPr/>
+          <a:lstStyle/>
+          <a:p>
+            <a:r>
+              <a:rPr lang="en-US" dirty="0"/>
+              <a:t>The answer here is Online Forums. Since Luis already checked technical documentation and couldn’t find the answer to his question, he should use online forums to find the answer to his specific question.</a:t>
+            </a:r>
+          </a:p>
+        </p:txBody>
+      </p:sp>
+      <p:sp>
+        <p:nvSpPr>
+          <p:cNvPr id="4" name="Slide Number Placeholder 3"/>
+          <p:cNvSpPr>
+            <a:spLocks noGrp="1"/>
+          </p:cNvSpPr>
+          <p:nvPr>
+            <p:ph type="sldNum" sz="quarter" idx="5"/>
+          </p:nvPr>
+        </p:nvSpPr>
+        <p:spPr/>
+        <p:txBody>
+          <a:bodyPr/>
+          <a:lstStyle/>
+          <a:p>
+            <a:fld id="{DF811066-0135-4CAA-8AD4-89A97190AC00}" type="slidenum">
+              <a:rPr lang="en-US" smtClean="0"/>
+              <a:t>13</a:t>
+            </a:fld>
+            <a:endParaRPr lang="en-US"/>
+          </a:p>
+        </p:txBody>
+      </p:sp>
+    </p:spTree>
+    <p:extLst>
+      <p:ext uri="{BB962C8B-B14F-4D97-AF65-F5344CB8AC3E}">
+        <p14:creationId xmlns:p14="http://schemas.microsoft.com/office/powerpoint/2010/main" val="2405919926"/>
+      </p:ext>
+    </p:extLst>
+  </p:cSld>
+  <p:clrMapOvr>
+    <a:masterClrMapping/>
+  </p:clrMapOvr>
+</p:notes>
+</file>
+
+<file path=ppt/notesSlides/notesSlide14.xml><?xml version="1.0" encoding="utf-8"?>
+<p:notes xmlns:a="http://schemas.openxmlformats.org/drawingml/2006/main" xmlns:r="http://schemas.openxmlformats.org/officeDocument/2006/relationships" xmlns:p="http://schemas.openxmlformats.org/presentationml/2006/main">
+  <p:cSld>
+    <p:spTree>
+      <p:nvGrpSpPr>
+        <p:cNvPr id="1" name=""/>
+        <p:cNvGrpSpPr/>
+        <p:nvPr/>
+      </p:nvGrpSpPr>
+      <p:grpSpPr>
+        <a:xfrm>
+          <a:off x="0" y="0"/>
+          <a:ext cx="0" cy="0"/>
+          <a:chOff x="0" y="0"/>
+          <a:chExt cx="0" cy="0"/>
+        </a:xfrm>
+      </p:grpSpPr>
+      <p:sp>
+        <p:nvSpPr>
+          <p:cNvPr id="2" name="Slide Image Placeholder 1"/>
+          <p:cNvSpPr>
+            <a:spLocks noGrp="1" noRot="1" noChangeAspect="1"/>
+          </p:cNvSpPr>
+          <p:nvPr>
+            <p:ph type="sldImg"/>
+          </p:nvPr>
+        </p:nvSpPr>
+        <p:spPr/>
+      </p:sp>
+      <p:sp>
+        <p:nvSpPr>
+          <p:cNvPr id="3" name="Notes Placeholder 2"/>
+          <p:cNvSpPr>
+            <a:spLocks noGrp="1"/>
+          </p:cNvSpPr>
+          <p:nvPr>
+            <p:ph type="body" idx="1"/>
+          </p:nvPr>
+        </p:nvSpPr>
+        <p:spPr/>
+        <p:txBody>
+          <a:bodyPr/>
+          <a:lstStyle/>
+          <a:p>
+            <a:r>
+              <a:rPr lang="en-US" dirty="0"/>
+              <a:t>Now that you know a little more about the types of online resources you may encounter when you just google it, you should be able to select the resources that fit your needs when you see the google results! Thank you.</a:t>
+            </a:r>
+          </a:p>
+        </p:txBody>
+      </p:sp>
+      <p:sp>
+        <p:nvSpPr>
+          <p:cNvPr id="4" name="Slide Number Placeholder 3"/>
+          <p:cNvSpPr>
+            <a:spLocks noGrp="1"/>
+          </p:cNvSpPr>
+          <p:nvPr>
+            <p:ph type="sldNum" sz="quarter" idx="5"/>
+          </p:nvPr>
+        </p:nvSpPr>
+        <p:spPr/>
+        <p:txBody>
+          <a:bodyPr/>
+          <a:lstStyle/>
+          <a:p>
+            <a:fld id="{DF811066-0135-4CAA-8AD4-89A97190AC00}" type="slidenum">
+              <a:rPr lang="en-US" smtClean="0"/>
+              <a:t>14</a:t>
+            </a:fld>
+            <a:endParaRPr lang="en-US"/>
+          </a:p>
+        </p:txBody>
+      </p:sp>
+    </p:spTree>
+    <p:extLst>
+      <p:ext uri="{BB962C8B-B14F-4D97-AF65-F5344CB8AC3E}">
+        <p14:creationId xmlns:p14="http://schemas.microsoft.com/office/powerpoint/2010/main" val="3990263809"/>
       </p:ext>
     </p:extLst>
   </p:cSld>
@@ -660,7 +1052,28 @@
           <a:bodyPr/>
           <a:lstStyle/>
           <a:p>
+            <a:r>
+              <a:rPr lang="en-US" dirty="0"/>
+              <a:t>Once common “recommendation” you may receive as you are seeking answers to data science questions is “Just Google it”</a:t>
+            </a:r>
+          </a:p>
+          <a:p>
             <a:endParaRPr lang="en-US" dirty="0"/>
+          </a:p>
+          <a:p>
+            <a:r>
+              <a:rPr lang="en-US" dirty="0"/>
+              <a:t>What happens when you ”Just google it”</a:t>
+            </a:r>
+          </a:p>
+          <a:p>
+            <a:endParaRPr lang="en-US" dirty="0"/>
+          </a:p>
+          <a:p>
+            <a:r>
+              <a:rPr lang="en-US" dirty="0"/>
+              <a:t>Well…</a:t>
+            </a:r>
           </a:p>
         </p:txBody>
       </p:sp>
@@ -689,7 +1102,7 @@
                 <a:cs typeface="Arial" pitchFamily="34" charset="0"/>
               </a:rPr>
               <a:pPr algn="r"/>
-              <a:t>3</a:t>
+              <a:t>2</a:t>
             </a:fld>
             <a:endParaRPr lang="en-US" dirty="0">
               <a:solidFill>
@@ -737,7 +1150,7 @@
     </p:spTree>
     <p:extLst>
       <p:ext uri="{BB962C8B-B14F-4D97-AF65-F5344CB8AC3E}">
-        <p14:creationId xmlns:p14="http://schemas.microsoft.com/office/powerpoint/2010/main" val="913589350"/>
+        <p14:creationId xmlns:p14="http://schemas.microsoft.com/office/powerpoint/2010/main" val="3205321747"/>
       </p:ext>
     </p:extLst>
   </p:cSld>
@@ -793,7 +1206,7 @@
           <a:p>
             <a:r>
               <a:rPr lang="en-US" dirty="0"/>
-              <a:t>We will emphasize forums a little more because they’re underused</a:t>
+              <a:t>You get a ton of google results. After all, there are a lot of data science resources available online. However, this is definitely  overwhelming, and you need a way to select the resource that best fits your specific learning needs.</a:t>
             </a:r>
           </a:p>
         </p:txBody>
@@ -823,7 +1236,7 @@
                 <a:cs typeface="Arial" pitchFamily="34" charset="0"/>
               </a:rPr>
               <a:pPr algn="r"/>
-              <a:t>4</a:t>
+              <a:t>3</a:t>
             </a:fld>
             <a:endParaRPr lang="en-US" dirty="0">
               <a:solidFill>
@@ -871,7 +1284,7 @@
     </p:spTree>
     <p:extLst>
       <p:ext uri="{BB962C8B-B14F-4D97-AF65-F5344CB8AC3E}">
-        <p14:creationId xmlns:p14="http://schemas.microsoft.com/office/powerpoint/2010/main" val="2359460663"/>
+        <p14:creationId xmlns:p14="http://schemas.microsoft.com/office/powerpoint/2010/main" val="913589350"/>
       </p:ext>
     </p:extLst>
   </p:cSld>
@@ -927,22 +1340,7 @@
           <a:p>
             <a:r>
               <a:rPr lang="en-US" dirty="0"/>
-              <a:t>If you don’t even know the right questions to ask, online courses could help get you oriented. </a:t>
-            </a:r>
-          </a:p>
-          <a:p>
-            <a:endParaRPr lang="en-US" dirty="0"/>
-          </a:p>
-          <a:p>
-            <a:r>
-              <a:rPr lang="en-US" dirty="0"/>
-              <a:t>Asynchronous courses are self-paced, and they’re nice if you need flexibility.</a:t>
-            </a:r>
-          </a:p>
-          <a:p>
-            <a:r>
-              <a:rPr lang="en-US" dirty="0"/>
-              <a:t>Synchronous courses are live, and they’ve nice if you want a community.</a:t>
+              <a:t>Today we will discuss three types of resources you should be aware of: Courses, Technical Documentation, and Forums. There are other types of online data science resources out there, but these three types should cover most of your needs.</a:t>
             </a:r>
           </a:p>
         </p:txBody>
@@ -972,7 +1370,7 @@
                 <a:cs typeface="Arial" pitchFamily="34" charset="0"/>
               </a:rPr>
               <a:pPr algn="r"/>
-              <a:t>5</a:t>
+              <a:t>4</a:t>
             </a:fld>
             <a:endParaRPr lang="en-US" dirty="0">
               <a:solidFill>
@@ -1020,7 +1418,7 @@
     </p:spTree>
     <p:extLst>
       <p:ext uri="{BB962C8B-B14F-4D97-AF65-F5344CB8AC3E}">
-        <p14:creationId xmlns:p14="http://schemas.microsoft.com/office/powerpoint/2010/main" val="4063864697"/>
+        <p14:creationId xmlns:p14="http://schemas.microsoft.com/office/powerpoint/2010/main" val="2359460663"/>
       </p:ext>
     </p:extLst>
   </p:cSld>
@@ -1076,7 +1474,7 @@
           <a:p>
             <a:r>
               <a:rPr lang="en-US" dirty="0"/>
-              <a:t>Technical documentation is good if you have questions about a specific tool or skill.</a:t>
+              <a:t>First, let’s talk about courses. Online courses are super useful when you need to get oriented around a new topic area. If you aren’t sure what are the right questions to ask, online courses are a great starting point. The two main types of online courses are Asynchronous and Synchronous. </a:t>
             </a:r>
           </a:p>
           <a:p>
@@ -1085,7 +1483,45 @@
           <a:p>
             <a:r>
               <a:rPr lang="en-US" dirty="0"/>
-              <a:t>To navigate the information within technical documentation, try to figure out what a tool does -&gt; how do you use it -&gt; how does it work</a:t>
+              <a:t>Asynchronous courses are self-paced, and you can fit them to your schedule. If you need flexibility, asynchronous courses could be a good fit for you. A few examples of asynchronous course providers are Coursera, LinkedIn Learning, </a:t>
+            </a:r>
+            <a:r>
+              <a:rPr lang="en-US" dirty="0" err="1"/>
+              <a:t>FreeCodeCamp</a:t>
+            </a:r>
+            <a:r>
+              <a:rPr lang="en-US" dirty="0"/>
+              <a:t>, and EdX.</a:t>
+            </a:r>
+          </a:p>
+          <a:p>
+            <a:r>
+              <a:rPr lang="en-US" dirty="0"/>
+              <a:t>Synchronous courses are taught in real time, and while they aren’t as flexible as asynchronous courses, they provide more opportunities for you to meet other learners who are learning at the same pace as you. For those of you who need a sense of community in your learning experience, synchronous courses are the way to go. The Data Science Initiative at UCSF Library provides synchronous workshops regularly, so be sure to check out the scheduled workshops.</a:t>
+            </a:r>
+          </a:p>
+          <a:p>
+            <a:endParaRPr lang="en-US" dirty="0"/>
+          </a:p>
+          <a:p>
+            <a:r>
+              <a:rPr lang="en-US" dirty="0"/>
+              <a:t>If you don’t even know the right questions to ask, online courses could help get you oriented. </a:t>
+            </a:r>
+          </a:p>
+          <a:p>
+            <a:endParaRPr lang="en-US" dirty="0"/>
+          </a:p>
+          <a:p>
+            <a:r>
+              <a:rPr lang="en-US" dirty="0"/>
+              <a:t>Asynchronous courses are self-paced, and they’re nice if you need flexibility.</a:t>
+            </a:r>
+          </a:p>
+          <a:p>
+            <a:r>
+              <a:rPr lang="en-US" dirty="0"/>
+              <a:t>Synchronous courses are live, and they’ve nice if you want a community.</a:t>
             </a:r>
           </a:p>
         </p:txBody>
@@ -1115,7 +1551,7 @@
                 <a:cs typeface="Arial" pitchFamily="34" charset="0"/>
               </a:rPr>
               <a:pPr algn="r"/>
-              <a:t>6</a:t>
+              <a:t>5</a:t>
             </a:fld>
             <a:endParaRPr lang="en-US" dirty="0">
               <a:solidFill>
@@ -1163,7 +1599,7 @@
     </p:spTree>
     <p:extLst>
       <p:ext uri="{BB962C8B-B14F-4D97-AF65-F5344CB8AC3E}">
-        <p14:creationId xmlns:p14="http://schemas.microsoft.com/office/powerpoint/2010/main" val="1629430987"/>
+        <p14:creationId xmlns:p14="http://schemas.microsoft.com/office/powerpoint/2010/main" val="4063864697"/>
       </p:ext>
     </p:extLst>
   </p:cSld>
@@ -1219,7 +1655,165 @@
           <a:p>
             <a:r>
               <a:rPr lang="en-US" dirty="0"/>
-              <a:t>If technical documentation doesn’t make sense or your question isn’t covered, take a look at forums.</a:t>
+              <a:t>The next type of resource we’ll discuss is technical documentation. Technical documentation is useful when you need information about a specific tool or skill such as pandas, scikit learn, or GitHub. Almost all data science tools you use will have some form of technical documentation. The key to using technical documentation effectively is learning to drive before learning how the engine works. What this means is you should first figure out what a tool does and how you use it before investigating the internal workings of the tool. For example, let’s say I was curious about using the OLS function from the Python </a:t>
+            </a:r>
+            <a:r>
+              <a:rPr lang="en-US" dirty="0" err="1"/>
+              <a:t>Statsmodels</a:t>
+            </a:r>
+            <a:r>
+              <a:rPr lang="en-US" dirty="0"/>
+              <a:t> library. </a:t>
+            </a:r>
+          </a:p>
+        </p:txBody>
+      </p:sp>
+      <p:sp>
+        <p:nvSpPr>
+          <p:cNvPr id="4" name="Slide Number Placeholder 3"/>
+          <p:cNvSpPr>
+            <a:spLocks noGrp="1"/>
+          </p:cNvSpPr>
+          <p:nvPr>
+            <p:ph type="sldNum" sz="quarter" idx="10"/>
+          </p:nvPr>
+        </p:nvSpPr>
+        <p:spPr/>
+        <p:txBody>
+          <a:bodyPr/>
+          <a:lstStyle/>
+          <a:p>
+            <a:pPr algn="r"/>
+            <a:fld id="{111E5896-917A-4035-A860-408E1EC3CD51}" type="slidenum">
+              <a:rPr lang="en-US" smtClean="0">
+                <a:solidFill>
+                  <a:srgbClr val="052049"/>
+                </a:solidFill>
+                <a:latin typeface="Arial" pitchFamily="34" charset="0"/>
+                <a:cs typeface="Arial" pitchFamily="34" charset="0"/>
+              </a:rPr>
+              <a:pPr algn="r"/>
+              <a:t>6</a:t>
+            </a:fld>
+            <a:endParaRPr lang="en-US" dirty="0">
+              <a:solidFill>
+                <a:srgbClr val="052049"/>
+              </a:solidFill>
+              <a:latin typeface="Arial" pitchFamily="34" charset="0"/>
+              <a:cs typeface="Arial" pitchFamily="34" charset="0"/>
+            </a:endParaRPr>
+          </a:p>
+        </p:txBody>
+      </p:sp>
+      <p:sp>
+        <p:nvSpPr>
+          <p:cNvPr id="5" name="Footer Placeholder 4"/>
+          <p:cNvSpPr>
+            <a:spLocks noGrp="1"/>
+          </p:cNvSpPr>
+          <p:nvPr>
+            <p:ph type="ftr" sz="quarter" idx="11"/>
+          </p:nvPr>
+        </p:nvSpPr>
+        <p:spPr/>
+        <p:txBody>
+          <a:bodyPr/>
+          <a:lstStyle/>
+          <a:p>
+            <a:r>
+              <a:rPr lang="en-US" sz="800">
+                <a:solidFill>
+                  <a:srgbClr val="052049"/>
+                </a:solidFill>
+                <a:latin typeface="+mj-lt"/>
+              </a:rPr>
+              <a:t>| [footer text here]</a:t>
+            </a:r>
+            <a:endParaRPr lang="en-US" sz="800" dirty="0">
+              <a:solidFill>
+                <a:srgbClr val="052049"/>
+              </a:solidFill>
+              <a:latin typeface="+mj-lt"/>
+            </a:endParaRPr>
+          </a:p>
+        </p:txBody>
+      </p:sp>
+    </p:spTree>
+    <p:extLst>
+      <p:ext uri="{BB962C8B-B14F-4D97-AF65-F5344CB8AC3E}">
+        <p14:creationId xmlns:p14="http://schemas.microsoft.com/office/powerpoint/2010/main" val="1629430987"/>
+      </p:ext>
+    </p:extLst>
+  </p:cSld>
+  <p:clrMapOvr>
+    <a:masterClrMapping/>
+  </p:clrMapOvr>
+</p:notes>
+</file>
+
+<file path=ppt/notesSlides/notesSlide7.xml><?xml version="1.0" encoding="utf-8"?>
+<p:notes xmlns:a="http://schemas.openxmlformats.org/drawingml/2006/main" xmlns:r="http://schemas.openxmlformats.org/officeDocument/2006/relationships" xmlns:p="http://schemas.openxmlformats.org/presentationml/2006/main">
+  <p:cSld>
+    <p:spTree>
+      <p:nvGrpSpPr>
+        <p:cNvPr id="1" name=""/>
+        <p:cNvGrpSpPr/>
+        <p:nvPr/>
+      </p:nvGrpSpPr>
+      <p:grpSpPr>
+        <a:xfrm>
+          <a:off x="0" y="0"/>
+          <a:ext cx="0" cy="0"/>
+          <a:chOff x="0" y="0"/>
+          <a:chExt cx="0" cy="0"/>
+        </a:xfrm>
+      </p:grpSpPr>
+      <p:sp>
+        <p:nvSpPr>
+          <p:cNvPr id="2" name="Slide Image Placeholder 1"/>
+          <p:cNvSpPr>
+            <a:spLocks noGrp="1" noRot="1" noChangeAspect="1"/>
+          </p:cNvSpPr>
+          <p:nvPr>
+            <p:ph type="sldImg"/>
+          </p:nvPr>
+        </p:nvSpPr>
+        <p:spPr/>
+      </p:sp>
+      <p:sp>
+        <p:nvSpPr>
+          <p:cNvPr id="3" name="Notes Placeholder 2"/>
+          <p:cNvSpPr>
+            <a:spLocks noGrp="1"/>
+          </p:cNvSpPr>
+          <p:nvPr>
+            <p:ph type="body" idx="1"/>
+          </p:nvPr>
+        </p:nvSpPr>
+        <p:spPr/>
+        <p:txBody>
+          <a:bodyPr/>
+          <a:lstStyle/>
+          <a:p>
+            <a:r>
+              <a:rPr lang="en-US" dirty="0"/>
+              <a:t>Last but not least, let’s discuss online forums. Forums are useful for viewing discussion and posting specific questions. If you did not find what you were looking for in technical documentation, forums may be the way to go. Some examples of online forums are Kaggle, </a:t>
+            </a:r>
+            <a:r>
+              <a:rPr lang="en-US" dirty="0" err="1"/>
+              <a:t>stackoverflow</a:t>
+            </a:r>
+            <a:r>
+              <a:rPr lang="en-US" dirty="0"/>
+              <a:t>, and </a:t>
+            </a:r>
+            <a:r>
+              <a:rPr lang="en-US" dirty="0" err="1"/>
+              <a:t>Rstudio</a:t>
+            </a:r>
+            <a:r>
+              <a:rPr lang="en-US" dirty="0"/>
+              <a:t> community, we will discuss forums in more depth later since they are often underutilized.</a:t>
             </a:r>
           </a:p>
         </p:txBody>
@@ -1298,6 +1892,180 @@
     <p:extLst>
       <p:ext uri="{BB962C8B-B14F-4D97-AF65-F5344CB8AC3E}">
         <p14:creationId xmlns:p14="http://schemas.microsoft.com/office/powerpoint/2010/main" val="2328124479"/>
+      </p:ext>
+    </p:extLst>
+  </p:cSld>
+  <p:clrMapOvr>
+    <a:masterClrMapping/>
+  </p:clrMapOvr>
+</p:notes>
+</file>
+
+<file path=ppt/notesSlides/notesSlide8.xml><?xml version="1.0" encoding="utf-8"?>
+<p:notes xmlns:a="http://schemas.openxmlformats.org/drawingml/2006/main" xmlns:r="http://schemas.openxmlformats.org/officeDocument/2006/relationships" xmlns:p="http://schemas.openxmlformats.org/presentationml/2006/main">
+  <p:cSld>
+    <p:spTree>
+      <p:nvGrpSpPr>
+        <p:cNvPr id="1" name=""/>
+        <p:cNvGrpSpPr/>
+        <p:nvPr/>
+      </p:nvGrpSpPr>
+      <p:grpSpPr>
+        <a:xfrm>
+          <a:off x="0" y="0"/>
+          <a:ext cx="0" cy="0"/>
+          <a:chOff x="0" y="0"/>
+          <a:chExt cx="0" cy="0"/>
+        </a:xfrm>
+      </p:grpSpPr>
+      <p:sp>
+        <p:nvSpPr>
+          <p:cNvPr id="2" name="Slide Image Placeholder 1"/>
+          <p:cNvSpPr>
+            <a:spLocks noGrp="1" noRot="1" noChangeAspect="1"/>
+          </p:cNvSpPr>
+          <p:nvPr>
+            <p:ph type="sldImg"/>
+          </p:nvPr>
+        </p:nvSpPr>
+        <p:spPr/>
+      </p:sp>
+      <p:sp>
+        <p:nvSpPr>
+          <p:cNvPr id="3" name="Notes Placeholder 2"/>
+          <p:cNvSpPr>
+            <a:spLocks noGrp="1"/>
+          </p:cNvSpPr>
+          <p:nvPr>
+            <p:ph type="body" idx="1"/>
+          </p:nvPr>
+        </p:nvSpPr>
+        <p:spPr/>
+        <p:txBody>
+          <a:bodyPr/>
+          <a:lstStyle/>
+          <a:p>
+            <a:r>
+              <a:rPr lang="en-US" dirty="0"/>
+              <a:t>Let’s answer a few questions to check our understanding. First …</a:t>
+            </a:r>
+          </a:p>
+        </p:txBody>
+      </p:sp>
+      <p:sp>
+        <p:nvSpPr>
+          <p:cNvPr id="4" name="Slide Number Placeholder 3"/>
+          <p:cNvSpPr>
+            <a:spLocks noGrp="1"/>
+          </p:cNvSpPr>
+          <p:nvPr>
+            <p:ph type="sldNum" sz="quarter" idx="5"/>
+          </p:nvPr>
+        </p:nvSpPr>
+        <p:spPr/>
+        <p:txBody>
+          <a:bodyPr/>
+          <a:lstStyle/>
+          <a:p>
+            <a:fld id="{DF811066-0135-4CAA-8AD4-89A97190AC00}" type="slidenum">
+              <a:rPr lang="en-US" smtClean="0"/>
+              <a:t>8</a:t>
+            </a:fld>
+            <a:endParaRPr lang="en-US"/>
+          </a:p>
+        </p:txBody>
+      </p:sp>
+    </p:spTree>
+    <p:extLst>
+      <p:ext uri="{BB962C8B-B14F-4D97-AF65-F5344CB8AC3E}">
+        <p14:creationId xmlns:p14="http://schemas.microsoft.com/office/powerpoint/2010/main" val="3382676126"/>
+      </p:ext>
+    </p:extLst>
+  </p:cSld>
+  <p:clrMapOvr>
+    <a:masterClrMapping/>
+  </p:clrMapOvr>
+</p:notes>
+</file>
+
+<file path=ppt/notesSlides/notesSlide9.xml><?xml version="1.0" encoding="utf-8"?>
+<p:notes xmlns:a="http://schemas.openxmlformats.org/drawingml/2006/main" xmlns:r="http://schemas.openxmlformats.org/officeDocument/2006/relationships" xmlns:p="http://schemas.openxmlformats.org/presentationml/2006/main">
+  <p:cSld>
+    <p:spTree>
+      <p:nvGrpSpPr>
+        <p:cNvPr id="1" name=""/>
+        <p:cNvGrpSpPr/>
+        <p:nvPr/>
+      </p:nvGrpSpPr>
+      <p:grpSpPr>
+        <a:xfrm>
+          <a:off x="0" y="0"/>
+          <a:ext cx="0" cy="0"/>
+          <a:chOff x="0" y="0"/>
+          <a:chExt cx="0" cy="0"/>
+        </a:xfrm>
+      </p:grpSpPr>
+      <p:sp>
+        <p:nvSpPr>
+          <p:cNvPr id="2" name="Slide Image Placeholder 1"/>
+          <p:cNvSpPr>
+            <a:spLocks noGrp="1" noRot="1" noChangeAspect="1"/>
+          </p:cNvSpPr>
+          <p:nvPr>
+            <p:ph type="sldImg"/>
+          </p:nvPr>
+        </p:nvSpPr>
+        <p:spPr/>
+      </p:sp>
+      <p:sp>
+        <p:nvSpPr>
+          <p:cNvPr id="3" name="Notes Placeholder 2"/>
+          <p:cNvSpPr>
+            <a:spLocks noGrp="1"/>
+          </p:cNvSpPr>
+          <p:nvPr>
+            <p:ph type="body" idx="1"/>
+          </p:nvPr>
+        </p:nvSpPr>
+        <p:spPr/>
+        <p:txBody>
+          <a:bodyPr/>
+          <a:lstStyle/>
+          <a:p>
+            <a:r>
+              <a:rPr lang="en-US" dirty="0"/>
+              <a:t>The correct answer is A because Howard doesn’t have a fully formed question, and he just needs to be oriented around a new topic.</a:t>
+            </a:r>
+          </a:p>
+        </p:txBody>
+      </p:sp>
+      <p:sp>
+        <p:nvSpPr>
+          <p:cNvPr id="4" name="Slide Number Placeholder 3"/>
+          <p:cNvSpPr>
+            <a:spLocks noGrp="1"/>
+          </p:cNvSpPr>
+          <p:nvPr>
+            <p:ph type="sldNum" sz="quarter" idx="5"/>
+          </p:nvPr>
+        </p:nvSpPr>
+        <p:spPr/>
+        <p:txBody>
+          <a:bodyPr/>
+          <a:lstStyle/>
+          <a:p>
+            <a:fld id="{DF811066-0135-4CAA-8AD4-89A97190AC00}" type="slidenum">
+              <a:rPr lang="en-US" smtClean="0"/>
+              <a:t>9</a:t>
+            </a:fld>
+            <a:endParaRPr lang="en-US"/>
+          </a:p>
+        </p:txBody>
+      </p:sp>
+    </p:spTree>
+    <p:extLst>
+      <p:ext uri="{BB962C8B-B14F-4D97-AF65-F5344CB8AC3E}">
+        <p14:creationId xmlns:p14="http://schemas.microsoft.com/office/powerpoint/2010/main" val="3506170541"/>
       </p:ext>
     </p:extLst>
   </p:cSld>
@@ -1454,7 +2222,7 @@
           <a:p>
             <a:fld id="{7BFB377E-53ED-FE4D-83F9-4165E39010D6}" type="datetimeFigureOut">
               <a:rPr lang="en-US" smtClean="0"/>
-              <a:t>8/26/21</a:t>
+              <a:t>9/9/21</a:t>
             </a:fld>
             <a:endParaRPr lang="en-US"/>
           </a:p>
@@ -1652,7 +2420,7 @@
           <a:p>
             <a:fld id="{7BFB377E-53ED-FE4D-83F9-4165E39010D6}" type="datetimeFigureOut">
               <a:rPr lang="en-US" smtClean="0"/>
-              <a:t>8/26/21</a:t>
+              <a:t>9/9/21</a:t>
             </a:fld>
             <a:endParaRPr lang="en-US"/>
           </a:p>
@@ -1860,7 +2628,7 @@
           <a:p>
             <a:fld id="{7BFB377E-53ED-FE4D-83F9-4165E39010D6}" type="datetimeFigureOut">
               <a:rPr lang="en-US" smtClean="0"/>
-              <a:t>8/26/21</a:t>
+              <a:t>9/9/21</a:t>
             </a:fld>
             <a:endParaRPr lang="en-US"/>
           </a:p>
@@ -2505,7 +3273,7 @@
             <a:fld id="{7CA65D26-67D5-4CD2-90EC-E629659F24B3}" type="datetime1">
               <a:rPr lang="en-US" smtClean="0"/>
               <a:pPr/>
-              <a:t>8/26/21</a:t>
+              <a:t>9/9/21</a:t>
             </a:fld>
             <a:endParaRPr lang="en-US" dirty="0"/>
           </a:p>
@@ -2735,7 +3503,7 @@
             <a:fld id="{7CA65D26-67D5-4CD2-90EC-E629659F24B3}" type="datetime1">
               <a:rPr lang="en-US" smtClean="0"/>
               <a:pPr/>
-              <a:t>8/26/21</a:t>
+              <a:t>9/9/21</a:t>
             </a:fld>
             <a:endParaRPr lang="en-US" dirty="0"/>
           </a:p>
@@ -3114,7 +3882,7 @@
             <a:fld id="{7CA65D26-67D5-4CD2-90EC-E629659F24B3}" type="datetime1">
               <a:rPr lang="en-US" smtClean="0"/>
               <a:pPr/>
-              <a:t>8/26/21</a:t>
+              <a:t>9/9/21</a:t>
             </a:fld>
             <a:endParaRPr lang="en-US" dirty="0"/>
           </a:p>
@@ -3493,7 +4261,7 @@
             <a:fld id="{7CA65D26-67D5-4CD2-90EC-E629659F24B3}" type="datetime1">
               <a:rPr lang="en-US" smtClean="0"/>
               <a:pPr/>
-              <a:t>8/26/21</a:t>
+              <a:t>9/9/21</a:t>
             </a:fld>
             <a:endParaRPr lang="en-US" dirty="0"/>
           </a:p>
@@ -3881,7 +4649,7 @@
             <a:fld id="{7CA65D26-67D5-4CD2-90EC-E629659F24B3}" type="datetime1">
               <a:rPr lang="en-US" smtClean="0"/>
               <a:pPr/>
-              <a:t>8/26/21</a:t>
+              <a:t>9/9/21</a:t>
             </a:fld>
             <a:endParaRPr lang="en-US" dirty="0"/>
           </a:p>
@@ -4556,7 +5324,7 @@
           <a:p>
             <a:fld id="{7BFB377E-53ED-FE4D-83F9-4165E39010D6}" type="datetimeFigureOut">
               <a:rPr lang="en-US" smtClean="0"/>
-              <a:t>8/26/21</a:t>
+              <a:t>9/9/21</a:t>
             </a:fld>
             <a:endParaRPr lang="en-US"/>
           </a:p>
@@ -7360,7 +8128,7 @@
           <a:p>
             <a:fld id="{7BFB377E-53ED-FE4D-83F9-4165E39010D6}" type="datetimeFigureOut">
               <a:rPr lang="en-US" smtClean="0"/>
-              <a:t>8/26/21</a:t>
+              <a:t>9/9/21</a:t>
             </a:fld>
             <a:endParaRPr lang="en-US"/>
           </a:p>
@@ -8446,7 +9214,7 @@
           <a:p>
             <a:fld id="{F1482167-8811-434F-A92E-FCD7829DA7CB}" type="datetime1">
               <a:rPr lang="en-US" smtClean="0"/>
-              <a:t>8/26/21</a:t>
+              <a:t>9/9/21</a:t>
             </a:fld>
             <a:endParaRPr lang="en-US"/>
           </a:p>
@@ -8559,7 +9327,7 @@
           <a:p>
             <a:fld id="{E0DDE3D8-06A1-5448-8966-288515773649}" type="datetime1">
               <a:rPr lang="en-US" smtClean="0"/>
-              <a:t>8/26/21</a:t>
+              <a:t>9/9/21</a:t>
             </a:fld>
             <a:endParaRPr lang="en-US"/>
           </a:p>
@@ -8961,7 +9729,7 @@
           <a:p>
             <a:fld id="{7BFB377E-53ED-FE4D-83F9-4165E39010D6}" type="datetimeFigureOut">
               <a:rPr lang="en-US" smtClean="0"/>
-              <a:t>8/26/21</a:t>
+              <a:t>9/9/21</a:t>
             </a:fld>
             <a:endParaRPr lang="en-US"/>
           </a:p>
@@ -9373,7 +10141,7 @@
           <a:p>
             <a:fld id="{7BFB377E-53ED-FE4D-83F9-4165E39010D6}" type="datetimeFigureOut">
               <a:rPr lang="en-US" smtClean="0"/>
-              <a:t>8/26/21</a:t>
+              <a:t>9/9/21</a:t>
             </a:fld>
             <a:endParaRPr lang="en-US"/>
           </a:p>
@@ -9514,7 +10282,7 @@
           <a:p>
             <a:fld id="{7BFB377E-53ED-FE4D-83F9-4165E39010D6}" type="datetimeFigureOut">
               <a:rPr lang="en-US" smtClean="0"/>
-              <a:t>8/26/21</a:t>
+              <a:t>9/9/21</a:t>
             </a:fld>
             <a:endParaRPr lang="en-US"/>
           </a:p>
@@ -9627,7 +10395,7 @@
           <a:p>
             <a:fld id="{7BFB377E-53ED-FE4D-83F9-4165E39010D6}" type="datetimeFigureOut">
               <a:rPr lang="en-US" smtClean="0"/>
-              <a:t>8/26/21</a:t>
+              <a:t>9/9/21</a:t>
             </a:fld>
             <a:endParaRPr lang="en-US"/>
           </a:p>
@@ -9938,7 +10706,7 @@
           <a:p>
             <a:fld id="{7BFB377E-53ED-FE4D-83F9-4165E39010D6}" type="datetimeFigureOut">
               <a:rPr lang="en-US" smtClean="0"/>
-              <a:t>8/26/21</a:t>
+              <a:t>9/9/21</a:t>
             </a:fld>
             <a:endParaRPr lang="en-US"/>
           </a:p>
@@ -10226,7 +10994,7 @@
           <a:p>
             <a:fld id="{7BFB377E-53ED-FE4D-83F9-4165E39010D6}" type="datetimeFigureOut">
               <a:rPr lang="en-US" smtClean="0"/>
-              <a:t>8/26/21</a:t>
+              <a:t>9/9/21</a:t>
             </a:fld>
             <a:endParaRPr lang="en-US"/>
           </a:p>
@@ -10467,7 +11235,7 @@
           <a:p>
             <a:fld id="{7BFB377E-53ED-FE4D-83F9-4165E39010D6}" type="datetimeFigureOut">
               <a:rPr lang="en-US" smtClean="0"/>
-              <a:t>8/26/21</a:t>
+              <a:t>9/9/21</a:t>
             </a:fld>
             <a:endParaRPr lang="en-US"/>
           </a:p>
@@ -12136,7 +12904,7 @@
             <a:avLst/>
           </a:prstGeom>
           <a:solidFill>
-            <a:srgbClr val="052049"/>
+            <a:srgbClr val="112048"/>
           </a:solidFill>
           <a:ln>
             <a:noFill/>
@@ -12167,52 +12935,159 @@
           </a:p>
         </p:txBody>
       </p:sp>
-      <p:sp>
-        <p:nvSpPr>
-          <p:cNvPr id="10" name="TextBox 9">
+      <p:grpSp>
+        <p:nvGrpSpPr>
+          <p:cNvPr id="6" name="Group 5">
             <a:extLst>
               <a:ext uri="{FF2B5EF4-FFF2-40B4-BE49-F238E27FC236}">
-                <a16:creationId xmlns:a16="http://schemas.microsoft.com/office/drawing/2014/main" id="{7ADDA18C-D50D-3B41-A36D-C7252ABE830D}"/>
+                <a16:creationId xmlns:a16="http://schemas.microsoft.com/office/drawing/2014/main" id="{BC71E677-0CBB-9D4C-A649-00D1D1887340}"/>
               </a:ext>
             </a:extLst>
           </p:cNvPr>
-          <p:cNvSpPr txBox="1"/>
+          <p:cNvGrpSpPr/>
           <p:nvPr/>
-        </p:nvSpPr>
-        <p:spPr>
+        </p:nvGrpSpPr>
+        <p:grpSpPr>
           <a:xfrm>
-            <a:off x="686004" y="2562158"/>
-            <a:ext cx="10819993" cy="1733680"/>
+            <a:off x="345738" y="1857399"/>
+            <a:ext cx="11500527" cy="2810828"/>
+            <a:chOff x="423741" y="2336392"/>
+            <a:chExt cx="3356919" cy="2810827"/>
+          </a:xfrm>
+        </p:grpSpPr>
+        <p:sp>
+          <p:nvSpPr>
+            <p:cNvPr id="7" name="TextBox 6">
+              <a:extLst>
+                <a:ext uri="{FF2B5EF4-FFF2-40B4-BE49-F238E27FC236}">
+                  <a16:creationId xmlns:a16="http://schemas.microsoft.com/office/drawing/2014/main" id="{89268938-0E8B-A541-9E7E-733421F56448}"/>
+                </a:ext>
+              </a:extLst>
+            </p:cNvPr>
+            <p:cNvSpPr txBox="1"/>
+            <p:nvPr/>
+          </p:nvSpPr>
+          <p:spPr>
+            <a:xfrm>
+              <a:off x="423741" y="2336392"/>
+              <a:ext cx="3112783" cy="2123657"/>
+            </a:xfrm>
+            <a:prstGeom prst="rect">
+              <a:avLst/>
+            </a:prstGeom>
+            <a:noFill/>
+          </p:spPr>
+          <p:txBody>
+            <a:bodyPr wrap="square" rtlCol="0" anchor="ctr">
+              <a:spAutoFit/>
+            </a:bodyPr>
+            <a:lstStyle/>
+            <a:p>
+              <a:r>
+                <a:rPr lang="en-US" sz="6600" b="1" dirty="0">
+                  <a:solidFill>
+                    <a:schemeClr val="bg1"/>
+                  </a:solidFill>
+                  <a:latin typeface="Arial Nova" panose="020B0504020202020204" pitchFamily="34" charset="0"/>
+                  <a:ea typeface="Helvetica Neue" panose="02000503000000020004" pitchFamily="2" charset="0"/>
+                  <a:cs typeface="Helvetica Neue" panose="02000503000000020004" pitchFamily="2" charset="0"/>
+                </a:rPr>
+                <a:t>Finding Data Science Help Online</a:t>
+              </a:r>
+            </a:p>
+          </p:txBody>
+        </p:sp>
+        <p:sp>
+          <p:nvSpPr>
+            <p:cNvPr id="8" name="TextBox 7">
+              <a:extLst>
+                <a:ext uri="{FF2B5EF4-FFF2-40B4-BE49-F238E27FC236}">
+                  <a16:creationId xmlns:a16="http://schemas.microsoft.com/office/drawing/2014/main" id="{76A0F2E1-4E8D-984A-AFEB-E8E1DC466D5C}"/>
+                </a:ext>
+              </a:extLst>
+            </p:cNvPr>
+            <p:cNvSpPr txBox="1"/>
+            <p:nvPr/>
+          </p:nvSpPr>
+          <p:spPr>
+            <a:xfrm>
+              <a:off x="423741" y="4623999"/>
+              <a:ext cx="3356919" cy="523220"/>
+            </a:xfrm>
+            <a:prstGeom prst="rect">
+              <a:avLst/>
+            </a:prstGeom>
+            <a:noFill/>
+          </p:spPr>
+          <p:txBody>
+            <a:bodyPr wrap="square" lIns="91440" tIns="45720" rIns="91440" bIns="45720" rtlCol="0" anchor="t">
+              <a:spAutoFit/>
+            </a:bodyPr>
+            <a:lstStyle/>
+            <a:p>
+              <a:r>
+                <a:rPr lang="en-US" sz="2800" dirty="0">
+                  <a:solidFill>
+                    <a:schemeClr val="bg1"/>
+                  </a:solidFill>
+                  <a:latin typeface="Arial Nova Light" panose="020B0304020202020204" pitchFamily="34" charset="0"/>
+                  <a:ea typeface="Helvetica Neue Light" panose="02000403000000020004" pitchFamily="2" charset="0"/>
+                </a:rPr>
+                <a:t>Navigating Online Data Science Resources</a:t>
+              </a:r>
+            </a:p>
+          </p:txBody>
+        </p:sp>
+      </p:grpSp>
+      <p:pic>
+        <p:nvPicPr>
+          <p:cNvPr id="1026" name="Picture 2" descr="Strategies for Faculty to Alleviate Student Zoom Fatigue | Library Drop-in  Series - UCSF Events Calendar">
+            <a:extLst>
+              <a:ext uri="{FF2B5EF4-FFF2-40B4-BE49-F238E27FC236}">
+                <a16:creationId xmlns:a16="http://schemas.microsoft.com/office/drawing/2014/main" id="{B204D766-499E-9143-8137-DD1B09B106FF}"/>
+              </a:ext>
+            </a:extLst>
+          </p:cNvPr>
+          <p:cNvPicPr>
+            <a:picLocks noChangeAspect="1" noChangeArrowheads="1"/>
+          </p:cNvPicPr>
+          <p:nvPr/>
+        </p:nvPicPr>
+        <p:blipFill rotWithShape="1">
+          <a:blip r:embed="rId3">
+            <a:extLst>
+              <a:ext uri="{28A0092B-C50C-407E-A947-70E740481C1C}">
+                <a14:useLocalDpi xmlns:a14="http://schemas.microsoft.com/office/drawing/2010/main" val="0"/>
+              </a:ext>
+            </a:extLst>
+          </a:blip>
+          <a:srcRect l="6251" t="32548" r="9374" b="39271"/>
+          <a:stretch/>
+        </p:blipFill>
+        <p:spPr bwMode="auto">
+          <a:xfrm>
+            <a:off x="9220200" y="5669181"/>
+            <a:ext cx="2763045" cy="922855"/>
           </a:xfrm>
           <a:prstGeom prst="rect">
             <a:avLst/>
           </a:prstGeom>
           <a:noFill/>
+          <a:extLst>
+            <a:ext uri="{909E8E84-426E-40DD-AFC4-6F175D3DCCD1}">
+              <a14:hiddenFill xmlns:a14="http://schemas.microsoft.com/office/drawing/2010/main">
+                <a:solidFill>
+                  <a:srgbClr val="FFFFFF"/>
+                </a:solidFill>
+              </a14:hiddenFill>
+            </a:ext>
+          </a:extLst>
         </p:spPr>
-        <p:txBody>
-          <a:bodyPr wrap="square" rtlCol="0" anchor="ctr">
-            <a:spAutoFit/>
-          </a:bodyPr>
-          <a:lstStyle/>
-          <a:p>
-            <a:r>
-              <a:rPr lang="en-US" sz="5333" b="1" dirty="0">
-                <a:solidFill>
-                  <a:schemeClr val="bg1"/>
-                </a:solidFill>
-                <a:latin typeface="Arial Nova" panose="020B0504020202020204" pitchFamily="34" charset="0"/>
-                <a:ea typeface="Helvetica Neue" panose="02000503000000020004" pitchFamily="2" charset="0"/>
-                <a:cs typeface="Helvetica Neue" panose="02000503000000020004" pitchFamily="2" charset="0"/>
-              </a:rPr>
-              <a:t>Navigating Online Data Science Resources</a:t>
-            </a:r>
-          </a:p>
-        </p:txBody>
-      </p:sp>
+      </p:pic>
     </p:spTree>
     <p:extLst>
       <p:ext uri="{BB962C8B-B14F-4D97-AF65-F5344CB8AC3E}">
-        <p14:creationId xmlns:p14="http://schemas.microsoft.com/office/powerpoint/2010/main" val="2531847305"/>
+        <p14:creationId xmlns:p14="http://schemas.microsoft.com/office/powerpoint/2010/main" val="2714267469"/>
       </p:ext>
     </p:extLst>
   </p:cSld>
@@ -13860,6 +14735,39 @@
 </p:sld>
 </file>
 
+<file path=ppt/slides/slide14.xml><?xml version="1.0" encoding="utf-8"?>
+<p:sld xmlns:a="http://schemas.openxmlformats.org/drawingml/2006/main" xmlns:r="http://schemas.openxmlformats.org/officeDocument/2006/relationships" xmlns:p="http://schemas.openxmlformats.org/presentationml/2006/main">
+  <p:cSld>
+    <p:spTree>
+      <p:nvGrpSpPr>
+        <p:cNvPr id="1" name=""/>
+        <p:cNvGrpSpPr/>
+        <p:nvPr/>
+      </p:nvGrpSpPr>
+      <p:grpSpPr>
+        <a:xfrm>
+          <a:off x="0" y="0"/>
+          <a:ext cx="0" cy="0"/>
+          <a:chOff x="0" y="0"/>
+          <a:chExt cx="0" cy="0"/>
+        </a:xfrm>
+      </p:grpSpPr>
+    </p:spTree>
+    <p:extLst>
+      <p:ext uri="{BB962C8B-B14F-4D97-AF65-F5344CB8AC3E}">
+        <p14:creationId xmlns:p14="http://schemas.microsoft.com/office/powerpoint/2010/main" val="2533538191"/>
+      </p:ext>
+    </p:extLst>
+  </p:cSld>
+  <p:clrMapOvr>
+    <a:masterClrMapping/>
+  </p:clrMapOvr>
+  <p:transition>
+    <p:fade/>
+  </p:transition>
+</p:sld>
+</file>
+
 <file path=ppt/slides/slide2.xml><?xml version="1.0" encoding="utf-8"?>
 <p:sld xmlns:a="http://schemas.openxmlformats.org/drawingml/2006/main" xmlns:r="http://schemas.openxmlformats.org/officeDocument/2006/relationships" xmlns:p="http://schemas.openxmlformats.org/presentationml/2006/main">
   <p:cSld>
@@ -15576,11 +16484,11 @@
               <a:buChar char="•"/>
             </a:pPr>
             <a:r>
-              <a:rPr lang="en-US" sz="3600" b="1" dirty="0">
+              <a:rPr lang="en-US" sz="3600" dirty="0">
                 <a:solidFill>
                   <a:srgbClr val="051F49"/>
                 </a:solidFill>
-                <a:latin typeface="Arial Nova" panose="020B0504020202020204" pitchFamily="34" charset="0"/>
+                <a:latin typeface="Arial Nova Light" panose="020B0304020202020204" pitchFamily="34" charset="0"/>
                 <a:ea typeface="Helvetica Neue" panose="02000503000000020004" pitchFamily="2" charset="0"/>
                 <a:cs typeface="Helvetica Neue" panose="02000503000000020004" pitchFamily="2" charset="0"/>
               </a:rPr>
@@ -15599,13 +16507,13 @@
   <p:clrMapOvr>
     <a:masterClrMapping/>
   </p:clrMapOvr>
-  <mc:AlternateContent xmlns:mc="http://schemas.openxmlformats.org/markup-compatibility/2006">
-    <mc:Choice xmlns:p14="http://schemas.microsoft.com/office/powerpoint/2010/main" Requires="p14">
+  <mc:AlternateContent xmlns:mc="http://schemas.openxmlformats.org/markup-compatibility/2006" xmlns:p14="http://schemas.microsoft.com/office/powerpoint/2010/main">
+    <mc:Choice Requires="p14">
       <p:transition spd="med" p14:dur="700">
         <p:fade/>
       </p:transition>
     </mc:Choice>
-    <mc:Fallback>
+    <mc:Fallback xmlns="">
       <p:transition spd="med">
         <p:fade/>
       </p:transition>
@@ -15963,10 +16871,10 @@
       </p:grpSp>
       <p:grpSp>
         <p:nvGrpSpPr>
-          <p:cNvPr id="4" name="Group 3">
+          <p:cNvPr id="2" name="Group 1">
             <a:extLst>
               <a:ext uri="{FF2B5EF4-FFF2-40B4-BE49-F238E27FC236}">
-                <a16:creationId xmlns:a16="http://schemas.microsoft.com/office/drawing/2014/main" id="{7A3D94C7-F572-AB48-830B-DF85D6A0595E}"/>
+                <a16:creationId xmlns:a16="http://schemas.microsoft.com/office/drawing/2014/main" id="{D9C57E0D-4FBA-7440-AD15-BCB4658776D4}"/>
               </a:ext>
             </a:extLst>
           </p:cNvPr>
@@ -15975,374 +16883,18 @@
         </p:nvGrpSpPr>
         <p:grpSpPr>
           <a:xfrm>
-            <a:off x="1143000" y="1976933"/>
-            <a:ext cx="4761077" cy="3353403"/>
-            <a:chOff x="1143000" y="1976933"/>
-            <a:chExt cx="4761077" cy="3353403"/>
+            <a:off x="1143000" y="2822190"/>
+            <a:ext cx="4761077" cy="2508146"/>
+            <a:chOff x="766899" y="2133600"/>
+            <a:chExt cx="5773601" cy="3041546"/>
           </a:xfrm>
         </p:grpSpPr>
-        <p:grpSp>
-          <p:nvGrpSpPr>
-            <p:cNvPr id="2" name="Group 1">
+        <p:pic>
+          <p:nvPicPr>
+            <p:cNvPr id="8" name="Picture 6">
               <a:extLst>
                 <a:ext uri="{FF2B5EF4-FFF2-40B4-BE49-F238E27FC236}">
-                  <a16:creationId xmlns:a16="http://schemas.microsoft.com/office/drawing/2014/main" id="{D9C57E0D-4FBA-7440-AD15-BCB4658776D4}"/>
-                </a:ext>
-              </a:extLst>
-            </p:cNvPr>
-            <p:cNvGrpSpPr/>
-            <p:nvPr/>
-          </p:nvGrpSpPr>
-          <p:grpSpPr>
-            <a:xfrm>
-              <a:off x="1143000" y="2822190"/>
-              <a:ext cx="4761077" cy="2508146"/>
-              <a:chOff x="766899" y="2133600"/>
-              <a:chExt cx="5773601" cy="3041546"/>
-            </a:xfrm>
-          </p:grpSpPr>
-          <p:pic>
-            <p:nvPicPr>
-              <p:cNvPr id="8" name="Picture 6">
-                <a:extLst>
-                  <a:ext uri="{FF2B5EF4-FFF2-40B4-BE49-F238E27FC236}">
-                    <a16:creationId xmlns:a16="http://schemas.microsoft.com/office/drawing/2014/main" id="{49479DF6-A7AE-DB4B-B353-BDA84BB96360}"/>
-                  </a:ext>
-                </a:extLst>
-              </p:cNvPr>
-              <p:cNvPicPr>
-                <a:picLocks noChangeAspect="1" noChangeArrowheads="1"/>
-              </p:cNvPicPr>
-              <p:nvPr/>
-            </p:nvPicPr>
-            <p:blipFill>
-              <a:blip r:embed="rId3">
-                <a:extLst>
-                  <a:ext uri="{28A0092B-C50C-407E-A947-70E740481C1C}">
-                    <a14:useLocalDpi xmlns:a14="http://schemas.microsoft.com/office/drawing/2010/main" val="0"/>
-                  </a:ext>
-                </a:extLst>
-              </a:blip>
-              <a:srcRect/>
-              <a:stretch>
-                <a:fillRect/>
-              </a:stretch>
-            </p:blipFill>
-            <p:spPr bwMode="auto">
-              <a:xfrm>
-                <a:off x="766899" y="2796034"/>
-                <a:ext cx="1511300" cy="1511300"/>
-              </a:xfrm>
-              <a:prstGeom prst="rect">
-                <a:avLst/>
-              </a:prstGeom>
-              <a:noFill/>
-              <a:extLst>
-                <a:ext uri="{909E8E84-426E-40DD-AFC4-6F175D3DCCD1}">
-                  <a14:hiddenFill xmlns:a14="http://schemas.microsoft.com/office/drawing/2010/main">
-                    <a:solidFill>
-                      <a:srgbClr val="FFFFFF"/>
-                    </a:solidFill>
-                  </a14:hiddenFill>
-                </a:ext>
-              </a:extLst>
-            </p:spPr>
-          </p:pic>
-          <p:pic>
-            <p:nvPicPr>
-              <p:cNvPr id="9" name="Picture 4">
-                <a:extLst>
-                  <a:ext uri="{FF2B5EF4-FFF2-40B4-BE49-F238E27FC236}">
-                    <a16:creationId xmlns:a16="http://schemas.microsoft.com/office/drawing/2014/main" id="{84726EF4-29E9-C844-9F58-9EE7092E23C0}"/>
-                  </a:ext>
-                </a:extLst>
-              </p:cNvPr>
-              <p:cNvPicPr>
-                <a:picLocks noChangeAspect="1" noChangeArrowheads="1"/>
-              </p:cNvPicPr>
-              <p:nvPr/>
-            </p:nvPicPr>
-            <p:blipFill>
-              <a:blip r:embed="rId4">
-                <a:extLst>
-                  <a:ext uri="{28A0092B-C50C-407E-A947-70E740481C1C}">
-                    <a14:useLocalDpi xmlns:a14="http://schemas.microsoft.com/office/drawing/2010/main" val="0"/>
-                  </a:ext>
-                </a:extLst>
-              </a:blip>
-              <a:srcRect/>
-              <a:stretch>
-                <a:fillRect/>
-              </a:stretch>
-            </p:blipFill>
-            <p:spPr bwMode="auto">
-              <a:xfrm>
-                <a:off x="5029200" y="3225696"/>
-                <a:ext cx="1511300" cy="850900"/>
-              </a:xfrm>
-              <a:prstGeom prst="rect">
-                <a:avLst/>
-              </a:prstGeom>
-              <a:noFill/>
-              <a:extLst>
-                <a:ext uri="{909E8E84-426E-40DD-AFC4-6F175D3DCCD1}">
-                  <a14:hiddenFill xmlns:a14="http://schemas.microsoft.com/office/drawing/2010/main">
-                    <a:solidFill>
-                      <a:srgbClr val="FFFFFF"/>
-                    </a:solidFill>
-                  </a14:hiddenFill>
-                </a:ext>
-              </a:extLst>
-            </p:spPr>
-          </p:pic>
-          <p:pic>
-            <p:nvPicPr>
-              <p:cNvPr id="1026" name="Picture 2" descr="How to Use LinkedIn Learning Online Class | LinkedIn Learning, formerly  Lynda.com">
-                <a:extLst>
-                  <a:ext uri="{FF2B5EF4-FFF2-40B4-BE49-F238E27FC236}">
-                    <a16:creationId xmlns:a16="http://schemas.microsoft.com/office/drawing/2014/main" id="{CB3C44DA-DD56-8B46-A26B-7BA22869AF43}"/>
-                  </a:ext>
-                </a:extLst>
-              </p:cNvPr>
-              <p:cNvPicPr>
-                <a:picLocks noChangeAspect="1" noChangeArrowheads="1"/>
-              </p:cNvPicPr>
-              <p:nvPr/>
-            </p:nvPicPr>
-            <p:blipFill>
-              <a:blip r:embed="rId5">
-                <a:extLst>
-                  <a:ext uri="{28A0092B-C50C-407E-A947-70E740481C1C}">
-                    <a14:useLocalDpi xmlns:a14="http://schemas.microsoft.com/office/drawing/2010/main" val="0"/>
-                  </a:ext>
-                </a:extLst>
-              </a:blip>
-              <a:srcRect/>
-              <a:stretch>
-                <a:fillRect/>
-              </a:stretch>
-            </p:blipFill>
-            <p:spPr bwMode="auto">
-              <a:xfrm>
-                <a:off x="2273845" y="2133600"/>
-                <a:ext cx="2709333" cy="1524000"/>
-              </a:xfrm>
-              <a:prstGeom prst="rect">
-                <a:avLst/>
-              </a:prstGeom>
-              <a:noFill/>
-              <a:extLst>
-                <a:ext uri="{909E8E84-426E-40DD-AFC4-6F175D3DCCD1}">
-                  <a14:hiddenFill xmlns:a14="http://schemas.microsoft.com/office/drawing/2010/main">
-                    <a:solidFill>
-                      <a:srgbClr val="FFFFFF"/>
-                    </a:solidFill>
-                  </a14:hiddenFill>
-                </a:ext>
-              </a:extLst>
-            </p:spPr>
-          </p:pic>
-          <p:pic>
-            <p:nvPicPr>
-              <p:cNvPr id="1028" name="Picture 4" descr="Learn to Code — For Free — Coding Courses for Busy People">
-                <a:extLst>
-                  <a:ext uri="{FF2B5EF4-FFF2-40B4-BE49-F238E27FC236}">
-                    <a16:creationId xmlns:a16="http://schemas.microsoft.com/office/drawing/2014/main" id="{C6C0A791-9C4F-CF4A-BA02-843854CF5904}"/>
-                  </a:ext>
-                </a:extLst>
-              </p:cNvPr>
-              <p:cNvPicPr>
-                <a:picLocks noChangeAspect="1" noChangeArrowheads="1"/>
-              </p:cNvPicPr>
-              <p:nvPr/>
-            </p:nvPicPr>
-            <p:blipFill>
-              <a:blip r:embed="rId6">
-                <a:extLst>
-                  <a:ext uri="{28A0092B-C50C-407E-A947-70E740481C1C}">
-                    <a14:useLocalDpi xmlns:a14="http://schemas.microsoft.com/office/drawing/2010/main" val="0"/>
-                  </a:ext>
-                </a:extLst>
-              </a:blip>
-              <a:srcRect/>
-              <a:stretch>
-                <a:fillRect/>
-              </a:stretch>
-            </p:blipFill>
-            <p:spPr bwMode="auto">
-              <a:xfrm>
-                <a:off x="2273845" y="3651146"/>
-                <a:ext cx="2709334" cy="1524000"/>
-              </a:xfrm>
-              <a:prstGeom prst="rect">
-                <a:avLst/>
-              </a:prstGeom>
-              <a:noFill/>
-              <a:extLst>
-                <a:ext uri="{909E8E84-426E-40DD-AFC4-6F175D3DCCD1}">
-                  <a14:hiddenFill xmlns:a14="http://schemas.microsoft.com/office/drawing/2010/main">
-                    <a:solidFill>
-                      <a:srgbClr val="FFFFFF"/>
-                    </a:solidFill>
-                  </a14:hiddenFill>
-                </a:ext>
-              </a:extLst>
-            </p:spPr>
-          </p:pic>
-        </p:grpSp>
-        <p:sp>
-          <p:nvSpPr>
-            <p:cNvPr id="12" name="TextBox 11">
-              <a:extLst>
-                <a:ext uri="{FF2B5EF4-FFF2-40B4-BE49-F238E27FC236}">
-                  <a16:creationId xmlns:a16="http://schemas.microsoft.com/office/drawing/2014/main" id="{77CF2004-6295-A044-8851-A3C4225621E5}"/>
-                </a:ext>
-              </a:extLst>
-            </p:cNvPr>
-            <p:cNvSpPr txBox="1"/>
-            <p:nvPr/>
-          </p:nvSpPr>
-          <p:spPr>
-            <a:xfrm>
-              <a:off x="1801072" y="1976933"/>
-              <a:ext cx="3403392" cy="825739"/>
-            </a:xfrm>
-            <a:prstGeom prst="rect">
-              <a:avLst/>
-            </a:prstGeom>
-            <a:noFill/>
-          </p:spPr>
-          <p:txBody>
-            <a:bodyPr wrap="square" rtlCol="0" anchor="ctr">
-              <a:spAutoFit/>
-            </a:bodyPr>
-            <a:lstStyle/>
-            <a:p>
-              <a:pPr algn="ctr">
-                <a:spcAft>
-                  <a:spcPts val="600"/>
-                </a:spcAft>
-              </a:pPr>
-              <a:r>
-                <a:rPr lang="en-US" sz="2133" b="1" dirty="0">
-                  <a:solidFill>
-                    <a:srgbClr val="000000"/>
-                  </a:solidFill>
-                  <a:latin typeface="Arial Nova" panose="020B0504020202020204" pitchFamily="34" charset="0"/>
-                  <a:ea typeface="Helvetica Neue Light" panose="02000403000000020004" pitchFamily="2" charset="0"/>
-                </a:rPr>
-                <a:t>Asynchronous</a:t>
-              </a:r>
-            </a:p>
-            <a:p>
-              <a:pPr algn="ctr">
-                <a:spcAft>
-                  <a:spcPts val="600"/>
-                </a:spcAft>
-              </a:pPr>
-              <a:r>
-                <a:rPr lang="en-US" sz="2133" dirty="0">
-                  <a:solidFill>
-                    <a:srgbClr val="000000"/>
-                  </a:solidFill>
-                  <a:latin typeface="Arial Nova Light" panose="020B0304020202020204" pitchFamily="34" charset="0"/>
-                  <a:ea typeface="Helvetica Neue Light" panose="02000403000000020004" pitchFamily="2" charset="0"/>
-                </a:rPr>
-                <a:t>(self-paced)</a:t>
-              </a:r>
-            </a:p>
-          </p:txBody>
-        </p:sp>
-      </p:grpSp>
-      <p:grpSp>
-        <p:nvGrpSpPr>
-          <p:cNvPr id="5" name="Group 4">
-            <a:extLst>
-              <a:ext uri="{FF2B5EF4-FFF2-40B4-BE49-F238E27FC236}">
-                <a16:creationId xmlns:a16="http://schemas.microsoft.com/office/drawing/2014/main" id="{672C16A8-D47B-1A48-8D55-8231877DCF0C}"/>
-              </a:ext>
-            </a:extLst>
-          </p:cNvPr>
-          <p:cNvGrpSpPr/>
-          <p:nvPr/>
-        </p:nvGrpSpPr>
-        <p:grpSpPr>
-          <a:xfrm>
-            <a:off x="7132180" y="1976932"/>
-            <a:ext cx="3403392" cy="3353404"/>
-            <a:chOff x="7132180" y="1976932"/>
-            <a:chExt cx="3403392" cy="3353404"/>
-          </a:xfrm>
-        </p:grpSpPr>
-        <p:sp>
-          <p:nvSpPr>
-            <p:cNvPr id="22" name="TextBox 21">
-              <a:extLst>
-                <a:ext uri="{FF2B5EF4-FFF2-40B4-BE49-F238E27FC236}">
-                  <a16:creationId xmlns:a16="http://schemas.microsoft.com/office/drawing/2014/main" id="{C3857C26-3DC1-D043-AB46-7707DD6FCCF5}"/>
-                </a:ext>
-              </a:extLst>
-            </p:cNvPr>
-            <p:cNvSpPr txBox="1"/>
-            <p:nvPr/>
-          </p:nvSpPr>
-          <p:spPr>
-            <a:xfrm>
-              <a:off x="7132180" y="1976932"/>
-              <a:ext cx="3403392" cy="825739"/>
-            </a:xfrm>
-            <a:prstGeom prst="rect">
-              <a:avLst/>
-            </a:prstGeom>
-            <a:noFill/>
-          </p:spPr>
-          <p:txBody>
-            <a:bodyPr wrap="square" rtlCol="0" anchor="ctr">
-              <a:spAutoFit/>
-            </a:bodyPr>
-            <a:lstStyle/>
-            <a:p>
-              <a:pPr algn="ctr">
-                <a:spcAft>
-                  <a:spcPts val="600"/>
-                </a:spcAft>
-              </a:pPr>
-              <a:r>
-                <a:rPr lang="en-US" sz="2133" b="1" dirty="0">
-                  <a:solidFill>
-                    <a:srgbClr val="000000"/>
-                  </a:solidFill>
-                  <a:latin typeface="Arial Nova" panose="020B0504020202020204" pitchFamily="34" charset="0"/>
-                  <a:ea typeface="Helvetica Neue Light" panose="02000403000000020004" pitchFamily="2" charset="0"/>
-                </a:rPr>
-                <a:t>Synchronous</a:t>
-              </a:r>
-            </a:p>
-            <a:p>
-              <a:pPr algn="ctr">
-                <a:spcAft>
-                  <a:spcPts val="600"/>
-                </a:spcAft>
-              </a:pPr>
-              <a:r>
-                <a:rPr lang="en-US" sz="2133" dirty="0">
-                  <a:solidFill>
-                    <a:srgbClr val="000000"/>
-                  </a:solidFill>
-                  <a:latin typeface="Arial Nova Light" panose="020B0304020202020204" pitchFamily="34" charset="0"/>
-                  <a:ea typeface="Helvetica Neue Light" panose="02000403000000020004" pitchFamily="2" charset="0"/>
-                </a:rPr>
-                <a:t>(live instruction)</a:t>
-              </a:r>
-            </a:p>
-          </p:txBody>
-        </p:sp>
-        <p:pic>
-          <p:nvPicPr>
-            <p:cNvPr id="1030" name="Picture 6" descr="UCSF Data Science Initiative · GitHub">
-              <a:extLst>
-                <a:ext uri="{FF2B5EF4-FFF2-40B4-BE49-F238E27FC236}">
-                  <a16:creationId xmlns:a16="http://schemas.microsoft.com/office/drawing/2014/main" id="{233CE255-C02A-BF4C-8802-CD3D9C3C43CD}"/>
+                  <a16:creationId xmlns:a16="http://schemas.microsoft.com/office/drawing/2014/main" id="{49479DF6-A7AE-DB4B-B353-BDA84BB96360}"/>
                 </a:ext>
               </a:extLst>
             </p:cNvPr>
@@ -16352,7 +16904,7 @@
             <p:nvPr/>
           </p:nvPicPr>
           <p:blipFill>
-            <a:blip r:embed="rId7">
+            <a:blip r:embed="rId3">
               <a:extLst>
                 <a:ext uri="{28A0092B-C50C-407E-A947-70E740481C1C}">
                   <a14:useLocalDpi xmlns:a14="http://schemas.microsoft.com/office/drawing/2010/main" val="0"/>
@@ -16366,8 +16918,149 @@
           </p:blipFill>
           <p:spPr bwMode="auto">
             <a:xfrm>
-              <a:off x="7627376" y="2917336"/>
-              <a:ext cx="2413000" cy="2413000"/>
+              <a:off x="766899" y="2796034"/>
+              <a:ext cx="1511300" cy="1511300"/>
+            </a:xfrm>
+            <a:prstGeom prst="rect">
+              <a:avLst/>
+            </a:prstGeom>
+            <a:noFill/>
+            <a:extLst>
+              <a:ext uri="{909E8E84-426E-40DD-AFC4-6F175D3DCCD1}">
+                <a14:hiddenFill xmlns:a14="http://schemas.microsoft.com/office/drawing/2010/main">
+                  <a:solidFill>
+                    <a:srgbClr val="FFFFFF"/>
+                  </a:solidFill>
+                </a14:hiddenFill>
+              </a:ext>
+            </a:extLst>
+          </p:spPr>
+        </p:pic>
+        <p:pic>
+          <p:nvPicPr>
+            <p:cNvPr id="9" name="Picture 4">
+              <a:extLst>
+                <a:ext uri="{FF2B5EF4-FFF2-40B4-BE49-F238E27FC236}">
+                  <a16:creationId xmlns:a16="http://schemas.microsoft.com/office/drawing/2014/main" id="{84726EF4-29E9-C844-9F58-9EE7092E23C0}"/>
+                </a:ext>
+              </a:extLst>
+            </p:cNvPr>
+            <p:cNvPicPr>
+              <a:picLocks noChangeAspect="1" noChangeArrowheads="1"/>
+            </p:cNvPicPr>
+            <p:nvPr/>
+          </p:nvPicPr>
+          <p:blipFill>
+            <a:blip r:embed="rId4">
+              <a:extLst>
+                <a:ext uri="{28A0092B-C50C-407E-A947-70E740481C1C}">
+                  <a14:useLocalDpi xmlns:a14="http://schemas.microsoft.com/office/drawing/2010/main" val="0"/>
+                </a:ext>
+              </a:extLst>
+            </a:blip>
+            <a:srcRect/>
+            <a:stretch>
+              <a:fillRect/>
+            </a:stretch>
+          </p:blipFill>
+          <p:spPr bwMode="auto">
+            <a:xfrm>
+              <a:off x="5029200" y="3225696"/>
+              <a:ext cx="1511300" cy="850900"/>
+            </a:xfrm>
+            <a:prstGeom prst="rect">
+              <a:avLst/>
+            </a:prstGeom>
+            <a:noFill/>
+            <a:extLst>
+              <a:ext uri="{909E8E84-426E-40DD-AFC4-6F175D3DCCD1}">
+                <a14:hiddenFill xmlns:a14="http://schemas.microsoft.com/office/drawing/2010/main">
+                  <a:solidFill>
+                    <a:srgbClr val="FFFFFF"/>
+                  </a:solidFill>
+                </a14:hiddenFill>
+              </a:ext>
+            </a:extLst>
+          </p:spPr>
+        </p:pic>
+        <p:pic>
+          <p:nvPicPr>
+            <p:cNvPr id="1026" name="Picture 2" descr="How to Use LinkedIn Learning Online Class | LinkedIn Learning, formerly  Lynda.com">
+              <a:extLst>
+                <a:ext uri="{FF2B5EF4-FFF2-40B4-BE49-F238E27FC236}">
+                  <a16:creationId xmlns:a16="http://schemas.microsoft.com/office/drawing/2014/main" id="{CB3C44DA-DD56-8B46-A26B-7BA22869AF43}"/>
+                </a:ext>
+              </a:extLst>
+            </p:cNvPr>
+            <p:cNvPicPr>
+              <a:picLocks noChangeAspect="1" noChangeArrowheads="1"/>
+            </p:cNvPicPr>
+            <p:nvPr/>
+          </p:nvPicPr>
+          <p:blipFill>
+            <a:blip r:embed="rId5">
+              <a:extLst>
+                <a:ext uri="{28A0092B-C50C-407E-A947-70E740481C1C}">
+                  <a14:useLocalDpi xmlns:a14="http://schemas.microsoft.com/office/drawing/2010/main" val="0"/>
+                </a:ext>
+              </a:extLst>
+            </a:blip>
+            <a:srcRect/>
+            <a:stretch>
+              <a:fillRect/>
+            </a:stretch>
+          </p:blipFill>
+          <p:spPr bwMode="auto">
+            <a:xfrm>
+              <a:off x="2273845" y="2133600"/>
+              <a:ext cx="2709333" cy="1524000"/>
+            </a:xfrm>
+            <a:prstGeom prst="rect">
+              <a:avLst/>
+            </a:prstGeom>
+            <a:noFill/>
+            <a:extLst>
+              <a:ext uri="{909E8E84-426E-40DD-AFC4-6F175D3DCCD1}">
+                <a14:hiddenFill xmlns:a14="http://schemas.microsoft.com/office/drawing/2010/main">
+                  <a:solidFill>
+                    <a:srgbClr val="FFFFFF"/>
+                  </a:solidFill>
+                </a14:hiddenFill>
+              </a:ext>
+            </a:extLst>
+          </p:spPr>
+        </p:pic>
+        <p:pic>
+          <p:nvPicPr>
+            <p:cNvPr id="1028" name="Picture 4" descr="Learn to Code — For Free — Coding Courses for Busy People">
+              <a:extLst>
+                <a:ext uri="{FF2B5EF4-FFF2-40B4-BE49-F238E27FC236}">
+                  <a16:creationId xmlns:a16="http://schemas.microsoft.com/office/drawing/2014/main" id="{C6C0A791-9C4F-CF4A-BA02-843854CF5904}"/>
+                </a:ext>
+              </a:extLst>
+            </p:cNvPr>
+            <p:cNvPicPr>
+              <a:picLocks noChangeAspect="1" noChangeArrowheads="1"/>
+            </p:cNvPicPr>
+            <p:nvPr/>
+          </p:nvPicPr>
+          <p:blipFill>
+            <a:blip r:embed="rId6">
+              <a:extLst>
+                <a:ext uri="{28A0092B-C50C-407E-A947-70E740481C1C}">
+                  <a14:useLocalDpi xmlns:a14="http://schemas.microsoft.com/office/drawing/2010/main" val="0"/>
+                </a:ext>
+              </a:extLst>
+            </a:blip>
+            <a:srcRect/>
+            <a:stretch>
+              <a:fillRect/>
+            </a:stretch>
+          </p:blipFill>
+          <p:spPr bwMode="auto">
+            <a:xfrm>
+              <a:off x="2273845" y="3651146"/>
+              <a:ext cx="2709334" cy="1524000"/>
             </a:xfrm>
             <a:prstGeom prst="rect">
               <a:avLst/>
@@ -16385,6 +17078,179 @@
           </p:spPr>
         </p:pic>
       </p:grpSp>
+      <p:sp>
+        <p:nvSpPr>
+          <p:cNvPr id="12" name="TextBox 11">
+            <a:extLst>
+              <a:ext uri="{FF2B5EF4-FFF2-40B4-BE49-F238E27FC236}">
+                <a16:creationId xmlns:a16="http://schemas.microsoft.com/office/drawing/2014/main" id="{77CF2004-6295-A044-8851-A3C4225621E5}"/>
+              </a:ext>
+            </a:extLst>
+          </p:cNvPr>
+          <p:cNvSpPr txBox="1"/>
+          <p:nvPr/>
+        </p:nvSpPr>
+        <p:spPr>
+          <a:xfrm>
+            <a:off x="1801072" y="1976933"/>
+            <a:ext cx="3403392" cy="825739"/>
+          </a:xfrm>
+          <a:prstGeom prst="rect">
+            <a:avLst/>
+          </a:prstGeom>
+          <a:noFill/>
+        </p:spPr>
+        <p:txBody>
+          <a:bodyPr wrap="square" rtlCol="0" anchor="ctr">
+            <a:spAutoFit/>
+          </a:bodyPr>
+          <a:lstStyle/>
+          <a:p>
+            <a:pPr algn="ctr">
+              <a:spcAft>
+                <a:spcPts val="600"/>
+              </a:spcAft>
+            </a:pPr>
+            <a:r>
+              <a:rPr lang="en-US" sz="2133" b="1" dirty="0">
+                <a:solidFill>
+                  <a:srgbClr val="000000"/>
+                </a:solidFill>
+                <a:latin typeface="Arial Nova" panose="020B0504020202020204" pitchFamily="34" charset="0"/>
+                <a:ea typeface="Helvetica Neue Light" panose="02000403000000020004" pitchFamily="2" charset="0"/>
+              </a:rPr>
+              <a:t>Asynchronous</a:t>
+            </a:r>
+          </a:p>
+          <a:p>
+            <a:pPr algn="ctr">
+              <a:spcAft>
+                <a:spcPts val="600"/>
+              </a:spcAft>
+            </a:pPr>
+            <a:r>
+              <a:rPr lang="en-US" sz="2133" dirty="0">
+                <a:solidFill>
+                  <a:srgbClr val="000000"/>
+                </a:solidFill>
+                <a:latin typeface="Arial Nova Light" panose="020B0304020202020204" pitchFamily="34" charset="0"/>
+                <a:ea typeface="Helvetica Neue Light" panose="02000403000000020004" pitchFamily="2" charset="0"/>
+              </a:rPr>
+              <a:t>(self-paced)</a:t>
+            </a:r>
+          </a:p>
+        </p:txBody>
+      </p:sp>
+      <p:sp>
+        <p:nvSpPr>
+          <p:cNvPr id="22" name="TextBox 21">
+            <a:extLst>
+              <a:ext uri="{FF2B5EF4-FFF2-40B4-BE49-F238E27FC236}">
+                <a16:creationId xmlns:a16="http://schemas.microsoft.com/office/drawing/2014/main" id="{C3857C26-3DC1-D043-AB46-7707DD6FCCF5}"/>
+              </a:ext>
+            </a:extLst>
+          </p:cNvPr>
+          <p:cNvSpPr txBox="1"/>
+          <p:nvPr/>
+        </p:nvSpPr>
+        <p:spPr>
+          <a:xfrm>
+            <a:off x="7132180" y="1976932"/>
+            <a:ext cx="3403392" cy="825739"/>
+          </a:xfrm>
+          <a:prstGeom prst="rect">
+            <a:avLst/>
+          </a:prstGeom>
+          <a:noFill/>
+        </p:spPr>
+        <p:txBody>
+          <a:bodyPr wrap="square" rtlCol="0" anchor="ctr">
+            <a:spAutoFit/>
+          </a:bodyPr>
+          <a:lstStyle/>
+          <a:p>
+            <a:pPr algn="ctr">
+              <a:spcAft>
+                <a:spcPts val="600"/>
+              </a:spcAft>
+            </a:pPr>
+            <a:r>
+              <a:rPr lang="en-US" sz="2133" b="1" dirty="0">
+                <a:solidFill>
+                  <a:srgbClr val="000000"/>
+                </a:solidFill>
+                <a:latin typeface="Arial Nova" panose="020B0504020202020204" pitchFamily="34" charset="0"/>
+                <a:ea typeface="Helvetica Neue Light" panose="02000403000000020004" pitchFamily="2" charset="0"/>
+              </a:rPr>
+              <a:t>Synchronous</a:t>
+            </a:r>
+          </a:p>
+          <a:p>
+            <a:pPr algn="ctr">
+              <a:spcAft>
+                <a:spcPts val="600"/>
+              </a:spcAft>
+            </a:pPr>
+            <a:r>
+              <a:rPr lang="en-US" sz="2133" dirty="0">
+                <a:solidFill>
+                  <a:srgbClr val="000000"/>
+                </a:solidFill>
+                <a:latin typeface="Arial Nova Light" panose="020B0304020202020204" pitchFamily="34" charset="0"/>
+                <a:ea typeface="Helvetica Neue Light" panose="02000403000000020004" pitchFamily="2" charset="0"/>
+              </a:rPr>
+              <a:t>(live instruction)</a:t>
+            </a:r>
+          </a:p>
+        </p:txBody>
+      </p:sp>
+      <p:pic>
+        <p:nvPicPr>
+          <p:cNvPr id="1030" name="Picture 6" descr="UCSF Data Science Initiative · GitHub">
+            <a:extLst>
+              <a:ext uri="{FF2B5EF4-FFF2-40B4-BE49-F238E27FC236}">
+                <a16:creationId xmlns:a16="http://schemas.microsoft.com/office/drawing/2014/main" id="{233CE255-C02A-BF4C-8802-CD3D9C3C43CD}"/>
+              </a:ext>
+            </a:extLst>
+          </p:cNvPr>
+          <p:cNvPicPr>
+            <a:picLocks noChangeAspect="1" noChangeArrowheads="1"/>
+          </p:cNvPicPr>
+          <p:nvPr/>
+        </p:nvPicPr>
+        <p:blipFill>
+          <a:blip r:embed="rId7">
+            <a:extLst>
+              <a:ext uri="{28A0092B-C50C-407E-A947-70E740481C1C}">
+                <a14:useLocalDpi xmlns:a14="http://schemas.microsoft.com/office/drawing/2010/main" val="0"/>
+              </a:ext>
+            </a:extLst>
+          </a:blip>
+          <a:srcRect/>
+          <a:stretch>
+            <a:fillRect/>
+          </a:stretch>
+        </p:blipFill>
+        <p:spPr bwMode="auto">
+          <a:xfrm>
+            <a:off x="7627376" y="2917336"/>
+            <a:ext cx="2413000" cy="2413000"/>
+          </a:xfrm>
+          <a:prstGeom prst="rect">
+            <a:avLst/>
+          </a:prstGeom>
+          <a:noFill/>
+          <a:extLst>
+            <a:ext uri="{909E8E84-426E-40DD-AFC4-6F175D3DCCD1}">
+              <a14:hiddenFill xmlns:a14="http://schemas.microsoft.com/office/drawing/2010/main">
+                <a:solidFill>
+                  <a:srgbClr val="FFFFFF"/>
+                </a:solidFill>
+              </a14:hiddenFill>
+            </a:ext>
+          </a:extLst>
+        </p:spPr>
+      </p:pic>
     </p:spTree>
     <p:extLst>
       <p:ext uri="{BB962C8B-B14F-4D97-AF65-F5344CB8AC3E}">
@@ -16407,6 +17273,252 @@
       </p:transition>
     </mc:Fallback>
   </mc:AlternateContent>
+  <p:timing>
+    <p:tnLst>
+      <p:par>
+        <p:cTn id="1" dur="indefinite" restart="never" nodeType="tmRoot">
+          <p:childTnLst>
+            <p:seq concurrent="1" nextAc="seek">
+              <p:cTn id="2" dur="indefinite" nodeType="mainSeq">
+                <p:childTnLst>
+                  <p:par>
+                    <p:cTn id="3" fill="hold">
+                      <p:stCondLst>
+                        <p:cond delay="indefinite"/>
+                      </p:stCondLst>
+                      <p:childTnLst>
+                        <p:par>
+                          <p:cTn id="4" fill="hold">
+                            <p:stCondLst>
+                              <p:cond delay="0"/>
+                            </p:stCondLst>
+                            <p:childTnLst>
+                              <p:par>
+                                <p:cTn id="5" presetID="10" presetClass="entr" presetSubtype="0" fill="hold" grpId="0" nodeType="clickEffect">
+                                  <p:stCondLst>
+                                    <p:cond delay="0"/>
+                                  </p:stCondLst>
+                                  <p:childTnLst>
+                                    <p:set>
+                                      <p:cBhvr>
+                                        <p:cTn id="6" dur="1" fill="hold">
+                                          <p:stCondLst>
+                                            <p:cond delay="0"/>
+                                          </p:stCondLst>
+                                        </p:cTn>
+                                        <p:tgtEl>
+                                          <p:spTgt spid="12"/>
+                                        </p:tgtEl>
+                                        <p:attrNameLst>
+                                          <p:attrName>style.visibility</p:attrName>
+                                        </p:attrNameLst>
+                                      </p:cBhvr>
+                                      <p:to>
+                                        <p:strVal val="visible"/>
+                                      </p:to>
+                                    </p:set>
+                                    <p:animEffect transition="in" filter="fade">
+                                      <p:cBhvr>
+                                        <p:cTn id="7" dur="500"/>
+                                        <p:tgtEl>
+                                          <p:spTgt spid="12"/>
+                                        </p:tgtEl>
+                                      </p:cBhvr>
+                                    </p:animEffect>
+                                  </p:childTnLst>
+                                </p:cTn>
+                              </p:par>
+                            </p:childTnLst>
+                          </p:cTn>
+                        </p:par>
+                      </p:childTnLst>
+                    </p:cTn>
+                  </p:par>
+                  <p:par>
+                    <p:cTn id="8" fill="hold">
+                      <p:stCondLst>
+                        <p:cond delay="indefinite"/>
+                      </p:stCondLst>
+                      <p:childTnLst>
+                        <p:par>
+                          <p:cTn id="9" fill="hold">
+                            <p:stCondLst>
+                              <p:cond delay="0"/>
+                            </p:stCondLst>
+                            <p:childTnLst>
+                              <p:par>
+                                <p:cTn id="10" presetID="10" presetClass="entr" presetSubtype="0" fill="hold" nodeType="clickEffect">
+                                  <p:stCondLst>
+                                    <p:cond delay="0"/>
+                                  </p:stCondLst>
+                                  <p:childTnLst>
+                                    <p:set>
+                                      <p:cBhvr>
+                                        <p:cTn id="11" dur="1" fill="hold">
+                                          <p:stCondLst>
+                                            <p:cond delay="0"/>
+                                          </p:stCondLst>
+                                        </p:cTn>
+                                        <p:tgtEl>
+                                          <p:spTgt spid="2"/>
+                                        </p:tgtEl>
+                                        <p:attrNameLst>
+                                          <p:attrName>style.visibility</p:attrName>
+                                        </p:attrNameLst>
+                                      </p:cBhvr>
+                                      <p:to>
+                                        <p:strVal val="visible"/>
+                                      </p:to>
+                                    </p:set>
+                                    <p:animEffect transition="in" filter="fade">
+                                      <p:cBhvr>
+                                        <p:cTn id="12" dur="500"/>
+                                        <p:tgtEl>
+                                          <p:spTgt spid="2"/>
+                                        </p:tgtEl>
+                                      </p:cBhvr>
+                                    </p:animEffect>
+                                  </p:childTnLst>
+                                </p:cTn>
+                              </p:par>
+                            </p:childTnLst>
+                          </p:cTn>
+                        </p:par>
+                      </p:childTnLst>
+                    </p:cTn>
+                  </p:par>
+                  <p:par>
+                    <p:cTn id="13" fill="hold">
+                      <p:stCondLst>
+                        <p:cond delay="indefinite"/>
+                      </p:stCondLst>
+                      <p:childTnLst>
+                        <p:par>
+                          <p:cTn id="14" fill="hold">
+                            <p:stCondLst>
+                              <p:cond delay="0"/>
+                            </p:stCondLst>
+                            <p:childTnLst>
+                              <p:par>
+                                <p:cTn id="15" presetID="10" presetClass="entr" presetSubtype="0" fill="hold" grpId="0" nodeType="clickEffect">
+                                  <p:stCondLst>
+                                    <p:cond delay="0"/>
+                                  </p:stCondLst>
+                                  <p:childTnLst>
+                                    <p:set>
+                                      <p:cBhvr>
+                                        <p:cTn id="16" dur="1" fill="hold">
+                                          <p:stCondLst>
+                                            <p:cond delay="0"/>
+                                          </p:stCondLst>
+                                        </p:cTn>
+                                        <p:tgtEl>
+                                          <p:spTgt spid="22"/>
+                                        </p:tgtEl>
+                                        <p:attrNameLst>
+                                          <p:attrName>style.visibility</p:attrName>
+                                        </p:attrNameLst>
+                                      </p:cBhvr>
+                                      <p:to>
+                                        <p:strVal val="visible"/>
+                                      </p:to>
+                                    </p:set>
+                                    <p:animEffect transition="in" filter="fade">
+                                      <p:cBhvr>
+                                        <p:cTn id="17" dur="500"/>
+                                        <p:tgtEl>
+                                          <p:spTgt spid="22"/>
+                                        </p:tgtEl>
+                                      </p:cBhvr>
+                                    </p:animEffect>
+                                  </p:childTnLst>
+                                </p:cTn>
+                              </p:par>
+                            </p:childTnLst>
+                          </p:cTn>
+                        </p:par>
+                      </p:childTnLst>
+                    </p:cTn>
+                  </p:par>
+                  <p:par>
+                    <p:cTn id="18" fill="hold">
+                      <p:stCondLst>
+                        <p:cond delay="indefinite"/>
+                      </p:stCondLst>
+                      <p:childTnLst>
+                        <p:par>
+                          <p:cTn id="19" fill="hold">
+                            <p:stCondLst>
+                              <p:cond delay="0"/>
+                            </p:stCondLst>
+                            <p:childTnLst>
+                              <p:par>
+                                <p:cTn id="20" presetID="10" presetClass="entr" presetSubtype="0" fill="hold" nodeType="clickEffect">
+                                  <p:stCondLst>
+                                    <p:cond delay="0"/>
+                                  </p:stCondLst>
+                                  <p:childTnLst>
+                                    <p:set>
+                                      <p:cBhvr>
+                                        <p:cTn id="21" dur="1" fill="hold">
+                                          <p:stCondLst>
+                                            <p:cond delay="0"/>
+                                          </p:stCondLst>
+                                        </p:cTn>
+                                        <p:tgtEl>
+                                          <p:spTgt spid="1030"/>
+                                        </p:tgtEl>
+                                        <p:attrNameLst>
+                                          <p:attrName>style.visibility</p:attrName>
+                                        </p:attrNameLst>
+                                      </p:cBhvr>
+                                      <p:to>
+                                        <p:strVal val="visible"/>
+                                      </p:to>
+                                    </p:set>
+                                    <p:animEffect transition="in" filter="fade">
+                                      <p:cBhvr>
+                                        <p:cTn id="22" dur="500"/>
+                                        <p:tgtEl>
+                                          <p:spTgt spid="1030"/>
+                                        </p:tgtEl>
+                                      </p:cBhvr>
+                                    </p:animEffect>
+                                  </p:childTnLst>
+                                </p:cTn>
+                              </p:par>
+                            </p:childTnLst>
+                          </p:cTn>
+                        </p:par>
+                      </p:childTnLst>
+                    </p:cTn>
+                  </p:par>
+                </p:childTnLst>
+              </p:cTn>
+              <p:prevCondLst>
+                <p:cond evt="onPrev" delay="0">
+                  <p:tgtEl>
+                    <p:sldTgt/>
+                  </p:tgtEl>
+                </p:cond>
+              </p:prevCondLst>
+              <p:nextCondLst>
+                <p:cond evt="onNext" delay="0">
+                  <p:tgtEl>
+                    <p:sldTgt/>
+                  </p:tgtEl>
+                </p:cond>
+              </p:nextCondLst>
+            </p:seq>
+          </p:childTnLst>
+        </p:cTn>
+      </p:par>
+    </p:tnLst>
+    <p:bldLst>
+      <p:bldP spid="12" grpId="0"/>
+      <p:bldP spid="22" grpId="0"/>
+    </p:bldLst>
+  </p:timing>
 </p:sld>
 </file>
 
@@ -17041,6 +18153,145 @@
       </p:transition>
     </mc:Fallback>
   </mc:AlternateContent>
+  <p:timing>
+    <p:tnLst>
+      <p:par>
+        <p:cTn id="1" dur="indefinite" restart="never" nodeType="tmRoot">
+          <p:childTnLst>
+            <p:seq concurrent="1" nextAc="seek">
+              <p:cTn id="2" dur="indefinite" nodeType="mainSeq">
+                <p:childTnLst>
+                  <p:par>
+                    <p:cTn id="3" fill="hold">
+                      <p:stCondLst>
+                        <p:cond delay="indefinite"/>
+                      </p:stCondLst>
+                      <p:childTnLst>
+                        <p:par>
+                          <p:cTn id="4" fill="hold">
+                            <p:stCondLst>
+                              <p:cond delay="0"/>
+                            </p:stCondLst>
+                            <p:childTnLst>
+                              <p:par>
+                                <p:cTn id="5" presetID="10" presetClass="entr" presetSubtype="0" fill="hold" nodeType="clickEffect">
+                                  <p:stCondLst>
+                                    <p:cond delay="0"/>
+                                  </p:stCondLst>
+                                  <p:childTnLst>
+                                    <p:set>
+                                      <p:cBhvr>
+                                        <p:cTn id="6" dur="1" fill="hold">
+                                          <p:stCondLst>
+                                            <p:cond delay="0"/>
+                                          </p:stCondLst>
+                                        </p:cTn>
+                                        <p:tgtEl>
+                                          <p:spTgt spid="3"/>
+                                        </p:tgtEl>
+                                        <p:attrNameLst>
+                                          <p:attrName>style.visibility</p:attrName>
+                                        </p:attrNameLst>
+                                      </p:cBhvr>
+                                      <p:to>
+                                        <p:strVal val="visible"/>
+                                      </p:to>
+                                    </p:set>
+                                    <p:animEffect transition="in" filter="fade">
+                                      <p:cBhvr>
+                                        <p:cTn id="7" dur="500"/>
+                                        <p:tgtEl>
+                                          <p:spTgt spid="3"/>
+                                        </p:tgtEl>
+                                      </p:cBhvr>
+                                    </p:animEffect>
+                                  </p:childTnLst>
+                                </p:cTn>
+                              </p:par>
+                            </p:childTnLst>
+                          </p:cTn>
+                        </p:par>
+                      </p:childTnLst>
+                    </p:cTn>
+                  </p:par>
+                  <p:par>
+                    <p:cTn id="8" fill="hold">
+                      <p:stCondLst>
+                        <p:cond delay="indefinite"/>
+                      </p:stCondLst>
+                      <p:childTnLst>
+                        <p:par>
+                          <p:cTn id="9" fill="hold">
+                            <p:stCondLst>
+                              <p:cond delay="0"/>
+                            </p:stCondLst>
+                            <p:childTnLst>
+                              <p:par>
+                                <p:cTn id="10" presetID="10" presetClass="entr" presetSubtype="0" fill="hold" grpId="0" nodeType="clickEffect">
+                                  <p:stCondLst>
+                                    <p:cond delay="0"/>
+                                  </p:stCondLst>
+                                  <p:childTnLst>
+                                    <p:set>
+                                      <p:cBhvr>
+                                        <p:cTn id="11" dur="1" fill="hold">
+                                          <p:stCondLst>
+                                            <p:cond delay="0"/>
+                                          </p:stCondLst>
+                                        </p:cTn>
+                                        <p:tgtEl>
+                                          <p:spTgt spid="21"/>
+                                        </p:tgtEl>
+                                        <p:attrNameLst>
+                                          <p:attrName>style.visibility</p:attrName>
+                                        </p:attrNameLst>
+                                      </p:cBhvr>
+                                      <p:to>
+                                        <p:strVal val="visible"/>
+                                      </p:to>
+                                    </p:set>
+                                    <p:animEffect transition="in" filter="fade">
+                                      <p:cBhvr>
+                                        <p:cTn id="12" dur="500"/>
+                                        <p:tgtEl>
+                                          <p:spTgt spid="21"/>
+                                        </p:tgtEl>
+                                      </p:cBhvr>
+                                    </p:animEffect>
+                                  </p:childTnLst>
+                                </p:cTn>
+                              </p:par>
+                            </p:childTnLst>
+                          </p:cTn>
+                        </p:par>
+                      </p:childTnLst>
+                    </p:cTn>
+                  </p:par>
+                </p:childTnLst>
+              </p:cTn>
+              <p:prevCondLst>
+                <p:cond evt="onPrev" delay="0">
+                  <p:tgtEl>
+                    <p:sldTgt/>
+                  </p:tgtEl>
+                </p:cond>
+              </p:prevCondLst>
+              <p:nextCondLst>
+                <p:cond evt="onNext" delay="0">
+                  <p:tgtEl>
+                    <p:sldTgt/>
+                  </p:tgtEl>
+                </p:cond>
+              </p:nextCondLst>
+            </p:seq>
+          </p:childTnLst>
+        </p:cTn>
+      </p:par>
+    </p:tnLst>
+    <p:bldLst>
+      <p:bldP spid="21" grpId="0"/>
+    </p:bldLst>
+  </p:timing>
 </p:sld>
 </file>
 

</xml_diff>